<commit_message>
Welcome Screen Complete and Initial Grading System Implemented
</commit_message>
<xml_diff>
--- a/Determination of g diagram.pptx
+++ b/Determination of g diagram.pptx
@@ -24,6 +24,8 @@
     <p:sldId id="272" r:id="rId18"/>
     <p:sldId id="274" r:id="rId19"/>
     <p:sldId id="273" r:id="rId20"/>
+    <p:sldId id="275" r:id="rId21"/>
+    <p:sldId id="276" r:id="rId22"/>
   </p:sldIdLst>
   <p:sldSz cx="12192000" cy="6858000"/>
   <p:notesSz cx="6858000" cy="9144000"/>
@@ -279,7 +281,7 @@
           <a:p>
             <a:fld id="{40AE047B-88A8-4E73-BFC2-E0D791C9FE6D}" type="datetimeFigureOut">
               <a:rPr lang="en-GB" smtClean="0"/>
-              <a:t>22/04/2022</a:t>
+              <a:t>28/04/2022</a:t>
             </a:fld>
             <a:endParaRPr lang="en-GB"/>
           </a:p>
@@ -479,7 +481,7 @@
           <a:p>
             <a:fld id="{40AE047B-88A8-4E73-BFC2-E0D791C9FE6D}" type="datetimeFigureOut">
               <a:rPr lang="en-GB" smtClean="0"/>
-              <a:t>22/04/2022</a:t>
+              <a:t>28/04/2022</a:t>
             </a:fld>
             <a:endParaRPr lang="en-GB"/>
           </a:p>
@@ -689,7 +691,7 @@
           <a:p>
             <a:fld id="{40AE047B-88A8-4E73-BFC2-E0D791C9FE6D}" type="datetimeFigureOut">
               <a:rPr lang="en-GB" smtClean="0"/>
-              <a:t>22/04/2022</a:t>
+              <a:t>28/04/2022</a:t>
             </a:fld>
             <a:endParaRPr lang="en-GB"/>
           </a:p>
@@ -889,7 +891,7 @@
           <a:p>
             <a:fld id="{40AE047B-88A8-4E73-BFC2-E0D791C9FE6D}" type="datetimeFigureOut">
               <a:rPr lang="en-GB" smtClean="0"/>
-              <a:t>22/04/2022</a:t>
+              <a:t>28/04/2022</a:t>
             </a:fld>
             <a:endParaRPr lang="en-GB"/>
           </a:p>
@@ -1165,7 +1167,7 @@
           <a:p>
             <a:fld id="{40AE047B-88A8-4E73-BFC2-E0D791C9FE6D}" type="datetimeFigureOut">
               <a:rPr lang="en-GB" smtClean="0"/>
-              <a:t>22/04/2022</a:t>
+              <a:t>28/04/2022</a:t>
             </a:fld>
             <a:endParaRPr lang="en-GB"/>
           </a:p>
@@ -1433,7 +1435,7 @@
           <a:p>
             <a:fld id="{40AE047B-88A8-4E73-BFC2-E0D791C9FE6D}" type="datetimeFigureOut">
               <a:rPr lang="en-GB" smtClean="0"/>
-              <a:t>22/04/2022</a:t>
+              <a:t>28/04/2022</a:t>
             </a:fld>
             <a:endParaRPr lang="en-GB"/>
           </a:p>
@@ -1848,7 +1850,7 @@
           <a:p>
             <a:fld id="{40AE047B-88A8-4E73-BFC2-E0D791C9FE6D}" type="datetimeFigureOut">
               <a:rPr lang="en-GB" smtClean="0"/>
-              <a:t>22/04/2022</a:t>
+              <a:t>28/04/2022</a:t>
             </a:fld>
             <a:endParaRPr lang="en-GB"/>
           </a:p>
@@ -1990,7 +1992,7 @@
           <a:p>
             <a:fld id="{40AE047B-88A8-4E73-BFC2-E0D791C9FE6D}" type="datetimeFigureOut">
               <a:rPr lang="en-GB" smtClean="0"/>
-              <a:t>22/04/2022</a:t>
+              <a:t>28/04/2022</a:t>
             </a:fld>
             <a:endParaRPr lang="en-GB"/>
           </a:p>
@@ -2103,7 +2105,7 @@
           <a:p>
             <a:fld id="{40AE047B-88A8-4E73-BFC2-E0D791C9FE6D}" type="datetimeFigureOut">
               <a:rPr lang="en-GB" smtClean="0"/>
-              <a:t>22/04/2022</a:t>
+              <a:t>28/04/2022</a:t>
             </a:fld>
             <a:endParaRPr lang="en-GB"/>
           </a:p>
@@ -2416,7 +2418,7 @@
           <a:p>
             <a:fld id="{40AE047B-88A8-4E73-BFC2-E0D791C9FE6D}" type="datetimeFigureOut">
               <a:rPr lang="en-GB" smtClean="0"/>
-              <a:t>22/04/2022</a:t>
+              <a:t>28/04/2022</a:t>
             </a:fld>
             <a:endParaRPr lang="en-GB"/>
           </a:p>
@@ -2705,7 +2707,7 @@
           <a:p>
             <a:fld id="{40AE047B-88A8-4E73-BFC2-E0D791C9FE6D}" type="datetimeFigureOut">
               <a:rPr lang="en-GB" smtClean="0"/>
-              <a:t>22/04/2022</a:t>
+              <a:t>28/04/2022</a:t>
             </a:fld>
             <a:endParaRPr lang="en-GB"/>
           </a:p>
@@ -2948,7 +2950,7 @@
           <a:p>
             <a:fld id="{40AE047B-88A8-4E73-BFC2-E0D791C9FE6D}" type="datetimeFigureOut">
               <a:rPr lang="en-GB" smtClean="0"/>
-              <a:t>22/04/2022</a:t>
+              <a:t>28/04/2022</a:t>
             </a:fld>
             <a:endParaRPr lang="en-GB"/>
           </a:p>
@@ -7241,7 +7243,7 @@
         </p:nvSpPr>
         <p:spPr>
           <a:xfrm>
-            <a:off x="4957383" y="3168649"/>
+            <a:off x="6719571" y="2375362"/>
             <a:ext cx="4140200" cy="1409700"/>
           </a:xfrm>
           <a:prstGeom prst="roundRect">
@@ -7295,7 +7297,7 @@
         </p:nvSpPr>
         <p:spPr>
           <a:xfrm>
-            <a:off x="5328858" y="3550334"/>
+            <a:off x="7091046" y="2757047"/>
             <a:ext cx="3768725" cy="646331"/>
           </a:xfrm>
           <a:prstGeom prst="rect">
@@ -12630,6 +12632,1480 @@
     <p:extLst>
       <p:ext uri="{BB962C8B-B14F-4D97-AF65-F5344CB8AC3E}">
         <p14:creationId xmlns:p14="http://schemas.microsoft.com/office/powerpoint/2010/main" val="3998041510"/>
+      </p:ext>
+    </p:extLst>
+  </p:cSld>
+  <p:clrMapOvr>
+    <a:masterClrMapping/>
+  </p:clrMapOvr>
+</p:sld>
+</file>
+
+<file path=ppt/slides/slide20.xml><?xml version="1.0" encoding="utf-8"?>
+<p:sld xmlns:a="http://schemas.openxmlformats.org/drawingml/2006/main" xmlns:r="http://schemas.openxmlformats.org/officeDocument/2006/relationships" xmlns:p="http://schemas.openxmlformats.org/presentationml/2006/main">
+  <p:cSld>
+    <p:spTree>
+      <p:nvGrpSpPr>
+        <p:cNvPr id="1" name=""/>
+        <p:cNvGrpSpPr/>
+        <p:nvPr/>
+      </p:nvGrpSpPr>
+      <p:grpSpPr>
+        <a:xfrm>
+          <a:off x="0" y="0"/>
+          <a:ext cx="0" cy="0"/>
+          <a:chOff x="0" y="0"/>
+          <a:chExt cx="0" cy="0"/>
+        </a:xfrm>
+      </p:grpSpPr>
+      <p:sp>
+        <p:nvSpPr>
+          <p:cNvPr id="4" name="Rectangle: Rounded Corners 3">
+            <a:extLst>
+              <a:ext uri="{FF2B5EF4-FFF2-40B4-BE49-F238E27FC236}">
+                <a16:creationId xmlns:a16="http://schemas.microsoft.com/office/drawing/2014/main" id="{1ABC2421-0FAC-4502-8891-16AFBA4F1CF1}"/>
+              </a:ext>
+            </a:extLst>
+          </p:cNvPr>
+          <p:cNvSpPr/>
+          <p:nvPr/>
+        </p:nvSpPr>
+        <p:spPr>
+          <a:xfrm>
+            <a:off x="692169" y="578261"/>
+            <a:ext cx="3345661" cy="4260135"/>
+          </a:xfrm>
+          <a:prstGeom prst="roundRect">
+            <a:avLst/>
+          </a:prstGeom>
+          <a:solidFill>
+            <a:srgbClr val="7E827E"/>
+          </a:solidFill>
+          <a:ln w="57150">
+            <a:solidFill>
+              <a:schemeClr val="tx1"/>
+            </a:solidFill>
+          </a:ln>
+        </p:spPr>
+        <p:style>
+          <a:lnRef idx="2">
+            <a:schemeClr val="accent1">
+              <a:shade val="50000"/>
+            </a:schemeClr>
+          </a:lnRef>
+          <a:fillRef idx="1">
+            <a:schemeClr val="accent1"/>
+          </a:fillRef>
+          <a:effectRef idx="0">
+            <a:schemeClr val="accent1"/>
+          </a:effectRef>
+          <a:fontRef idx="minor">
+            <a:schemeClr val="lt1"/>
+          </a:fontRef>
+        </p:style>
+        <p:txBody>
+          <a:bodyPr rtlCol="0" anchor="ctr"/>
+          <a:lstStyle/>
+          <a:p>
+            <a:pPr algn="ctr"/>
+            <a:endParaRPr lang="en-GB"/>
+          </a:p>
+        </p:txBody>
+      </p:sp>
+      <p:sp>
+        <p:nvSpPr>
+          <p:cNvPr id="5" name="TextBox 4">
+            <a:extLst>
+              <a:ext uri="{FF2B5EF4-FFF2-40B4-BE49-F238E27FC236}">
+                <a16:creationId xmlns:a16="http://schemas.microsoft.com/office/drawing/2014/main" id="{606E181B-DAA0-4DC2-A45D-91A93709DB0D}"/>
+              </a:ext>
+            </a:extLst>
+          </p:cNvPr>
+          <p:cNvSpPr txBox="1"/>
+          <p:nvPr/>
+        </p:nvSpPr>
+        <p:spPr>
+          <a:xfrm>
+            <a:off x="1153875" y="804763"/>
+            <a:ext cx="2313250" cy="830997"/>
+          </a:xfrm>
+          <a:prstGeom prst="rect">
+            <a:avLst/>
+          </a:prstGeom>
+          <a:noFill/>
+        </p:spPr>
+        <p:txBody>
+          <a:bodyPr wrap="square" rtlCol="0">
+            <a:spAutoFit/>
+          </a:bodyPr>
+          <a:lstStyle/>
+          <a:p>
+            <a:pPr algn="ctr"/>
+            <a:r>
+              <a:rPr lang="en-GB" sz="2400" b="1" dirty="0">
+                <a:solidFill>
+                  <a:schemeClr val="bg1"/>
+                </a:solidFill>
+              </a:rPr>
+              <a:t>Determination of G</a:t>
+            </a:r>
+          </a:p>
+        </p:txBody>
+      </p:sp>
+      <p:sp>
+        <p:nvSpPr>
+          <p:cNvPr id="6" name="TextBox 5">
+            <a:extLst>
+              <a:ext uri="{FF2B5EF4-FFF2-40B4-BE49-F238E27FC236}">
+                <a16:creationId xmlns:a16="http://schemas.microsoft.com/office/drawing/2014/main" id="{06435237-202F-42C1-9B12-A9BD8BE28804}"/>
+              </a:ext>
+            </a:extLst>
+          </p:cNvPr>
+          <p:cNvSpPr txBox="1"/>
+          <p:nvPr/>
+        </p:nvSpPr>
+        <p:spPr>
+          <a:xfrm>
+            <a:off x="890188" y="1811642"/>
+            <a:ext cx="3034403" cy="1077218"/>
+          </a:xfrm>
+          <a:prstGeom prst="rect">
+            <a:avLst/>
+          </a:prstGeom>
+          <a:noFill/>
+        </p:spPr>
+        <p:txBody>
+          <a:bodyPr wrap="square" rtlCol="0">
+            <a:spAutoFit/>
+          </a:bodyPr>
+          <a:lstStyle/>
+          <a:p>
+            <a:r>
+              <a:rPr lang="en-GB" sz="1600" dirty="0">
+                <a:solidFill>
+                  <a:schemeClr val="bg1"/>
+                </a:solidFill>
+              </a:rPr>
+              <a:t>Use light gates and a ruler to drop a card and multiple heights in order to determine the acceleration caused by gravity.</a:t>
+            </a:r>
+          </a:p>
+        </p:txBody>
+      </p:sp>
+      <p:sp>
+        <p:nvSpPr>
+          <p:cNvPr id="7" name="TextBox 6">
+            <a:extLst>
+              <a:ext uri="{FF2B5EF4-FFF2-40B4-BE49-F238E27FC236}">
+                <a16:creationId xmlns:a16="http://schemas.microsoft.com/office/drawing/2014/main" id="{55A45E0E-286C-482B-91FE-7011C23E58AC}"/>
+              </a:ext>
+            </a:extLst>
+          </p:cNvPr>
+          <p:cNvSpPr txBox="1"/>
+          <p:nvPr/>
+        </p:nvSpPr>
+        <p:spPr>
+          <a:xfrm>
+            <a:off x="847797" y="3029329"/>
+            <a:ext cx="3034403" cy="1569660"/>
+          </a:xfrm>
+          <a:prstGeom prst="rect">
+            <a:avLst/>
+          </a:prstGeom>
+          <a:noFill/>
+        </p:spPr>
+        <p:txBody>
+          <a:bodyPr wrap="square" rtlCol="0">
+            <a:spAutoFit/>
+          </a:bodyPr>
+          <a:lstStyle/>
+          <a:p>
+            <a:r>
+              <a:rPr lang="en-GB" sz="1600" b="1" dirty="0">
+                <a:solidFill>
+                  <a:schemeClr val="bg1"/>
+                </a:solidFill>
+              </a:rPr>
+              <a:t>Skills Assessed:</a:t>
+            </a:r>
+          </a:p>
+          <a:p>
+            <a:pPr marL="285750" indent="-285750">
+              <a:buFont typeface="Arial" panose="020B0604020202020204" pitchFamily="34" charset="0"/>
+              <a:buChar char="•"/>
+            </a:pPr>
+            <a:r>
+              <a:rPr lang="en-GB" sz="1600" dirty="0">
+                <a:solidFill>
+                  <a:schemeClr val="bg1"/>
+                </a:solidFill>
+              </a:rPr>
+              <a:t>Taking multiple results</a:t>
+            </a:r>
+          </a:p>
+          <a:p>
+            <a:pPr marL="285750" indent="-285750">
+              <a:buFont typeface="Arial" panose="020B0604020202020204" pitchFamily="34" charset="0"/>
+              <a:buChar char="•"/>
+            </a:pPr>
+            <a:r>
+              <a:rPr lang="en-GB" sz="1600" dirty="0">
+                <a:solidFill>
+                  <a:schemeClr val="bg1"/>
+                </a:solidFill>
+              </a:rPr>
+              <a:t>Tabulating Results</a:t>
+            </a:r>
+          </a:p>
+          <a:p>
+            <a:pPr marL="285750" indent="-285750">
+              <a:buFont typeface="Arial" panose="020B0604020202020204" pitchFamily="34" charset="0"/>
+              <a:buChar char="•"/>
+            </a:pPr>
+            <a:r>
+              <a:rPr lang="en-GB" sz="1600" dirty="0">
+                <a:solidFill>
+                  <a:schemeClr val="bg1"/>
+                </a:solidFill>
+              </a:rPr>
+              <a:t>Anomaly detection</a:t>
+            </a:r>
+          </a:p>
+          <a:p>
+            <a:pPr marL="285750" indent="-285750">
+              <a:buFont typeface="Arial" panose="020B0604020202020204" pitchFamily="34" charset="0"/>
+              <a:buChar char="•"/>
+            </a:pPr>
+            <a:r>
+              <a:rPr lang="en-GB" sz="1600" dirty="0">
+                <a:solidFill>
+                  <a:schemeClr val="bg1"/>
+                </a:solidFill>
+              </a:rPr>
+              <a:t>Graphical Analysis</a:t>
+            </a:r>
+          </a:p>
+          <a:p>
+            <a:pPr marL="285750" indent="-285750">
+              <a:buFont typeface="Arial" panose="020B0604020202020204" pitchFamily="34" charset="0"/>
+              <a:buChar char="•"/>
+            </a:pPr>
+            <a:endParaRPr lang="en-GB" sz="1600" dirty="0">
+              <a:solidFill>
+                <a:schemeClr val="bg1"/>
+              </a:solidFill>
+            </a:endParaRPr>
+          </a:p>
+        </p:txBody>
+      </p:sp>
+      <p:sp>
+        <p:nvSpPr>
+          <p:cNvPr id="8" name="Rectangle: Rounded Corners 7">
+            <a:extLst>
+              <a:ext uri="{FF2B5EF4-FFF2-40B4-BE49-F238E27FC236}">
+                <a16:creationId xmlns:a16="http://schemas.microsoft.com/office/drawing/2014/main" id="{EA95DD15-D42B-42D1-8318-0783A26B273A}"/>
+              </a:ext>
+            </a:extLst>
+          </p:cNvPr>
+          <p:cNvSpPr/>
+          <p:nvPr/>
+        </p:nvSpPr>
+        <p:spPr>
+          <a:xfrm>
+            <a:off x="6481341" y="948664"/>
+            <a:ext cx="3345661" cy="1098140"/>
+          </a:xfrm>
+          <a:prstGeom prst="roundRect">
+            <a:avLst/>
+          </a:prstGeom>
+          <a:solidFill>
+            <a:srgbClr val="7E827E"/>
+          </a:solidFill>
+          <a:ln w="57150">
+            <a:solidFill>
+              <a:schemeClr val="tx1"/>
+            </a:solidFill>
+          </a:ln>
+        </p:spPr>
+        <p:style>
+          <a:lnRef idx="2">
+            <a:schemeClr val="accent1">
+              <a:shade val="50000"/>
+            </a:schemeClr>
+          </a:lnRef>
+          <a:fillRef idx="1">
+            <a:schemeClr val="accent1"/>
+          </a:fillRef>
+          <a:effectRef idx="0">
+            <a:schemeClr val="accent1"/>
+          </a:effectRef>
+          <a:fontRef idx="minor">
+            <a:schemeClr val="lt1"/>
+          </a:fontRef>
+        </p:style>
+        <p:txBody>
+          <a:bodyPr rtlCol="0" anchor="ctr"/>
+          <a:lstStyle/>
+          <a:p>
+            <a:pPr algn="ctr"/>
+            <a:endParaRPr lang="en-GB"/>
+          </a:p>
+        </p:txBody>
+      </p:sp>
+      <p:sp>
+        <p:nvSpPr>
+          <p:cNvPr id="9" name="TextBox 8">
+            <a:extLst>
+              <a:ext uri="{FF2B5EF4-FFF2-40B4-BE49-F238E27FC236}">
+                <a16:creationId xmlns:a16="http://schemas.microsoft.com/office/drawing/2014/main" id="{D3A9BDA0-7951-432A-9560-35F59375D854}"/>
+              </a:ext>
+            </a:extLst>
+          </p:cNvPr>
+          <p:cNvSpPr txBox="1"/>
+          <p:nvPr/>
+        </p:nvSpPr>
+        <p:spPr>
+          <a:xfrm>
+            <a:off x="6997546" y="1082235"/>
+            <a:ext cx="2313250" cy="830997"/>
+          </a:xfrm>
+          <a:prstGeom prst="rect">
+            <a:avLst/>
+          </a:prstGeom>
+          <a:noFill/>
+        </p:spPr>
+        <p:txBody>
+          <a:bodyPr wrap="square" rtlCol="0">
+            <a:spAutoFit/>
+          </a:bodyPr>
+          <a:lstStyle/>
+          <a:p>
+            <a:pPr algn="ctr"/>
+            <a:r>
+              <a:rPr lang="en-GB" sz="2400" b="1" dirty="0">
+                <a:solidFill>
+                  <a:schemeClr val="bg1"/>
+                </a:solidFill>
+              </a:rPr>
+              <a:t>Determination of G</a:t>
+            </a:r>
+          </a:p>
+        </p:txBody>
+      </p:sp>
+      <p:sp>
+        <p:nvSpPr>
+          <p:cNvPr id="13" name="Arrow: Up 12">
+            <a:extLst>
+              <a:ext uri="{FF2B5EF4-FFF2-40B4-BE49-F238E27FC236}">
+                <a16:creationId xmlns:a16="http://schemas.microsoft.com/office/drawing/2014/main" id="{676ECFE0-E174-4485-8AB5-122912BBC484}"/>
+              </a:ext>
+            </a:extLst>
+          </p:cNvPr>
+          <p:cNvSpPr/>
+          <p:nvPr/>
+        </p:nvSpPr>
+        <p:spPr>
+          <a:xfrm>
+            <a:off x="4667062" y="2350251"/>
+            <a:ext cx="1677409" cy="3151666"/>
+          </a:xfrm>
+          <a:prstGeom prst="upArrow">
+            <a:avLst/>
+          </a:prstGeom>
+          <a:solidFill>
+            <a:srgbClr val="FF0000"/>
+          </a:solidFill>
+          <a:ln w="57150">
+            <a:solidFill>
+              <a:schemeClr val="bg1"/>
+            </a:solidFill>
+          </a:ln>
+        </p:spPr>
+        <p:style>
+          <a:lnRef idx="2">
+            <a:schemeClr val="accent1">
+              <a:shade val="50000"/>
+            </a:schemeClr>
+          </a:lnRef>
+          <a:fillRef idx="1">
+            <a:schemeClr val="accent1"/>
+          </a:fillRef>
+          <a:effectRef idx="0">
+            <a:schemeClr val="accent1"/>
+          </a:effectRef>
+          <a:fontRef idx="minor">
+            <a:schemeClr val="lt1"/>
+          </a:fontRef>
+        </p:style>
+        <p:txBody>
+          <a:bodyPr rtlCol="0" anchor="ctr"/>
+          <a:lstStyle/>
+          <a:p>
+            <a:pPr algn="ctr"/>
+            <a:endParaRPr lang="en-GB"/>
+          </a:p>
+        </p:txBody>
+      </p:sp>
+      <p:sp>
+        <p:nvSpPr>
+          <p:cNvPr id="14" name="TextBox 13">
+            <a:extLst>
+              <a:ext uri="{FF2B5EF4-FFF2-40B4-BE49-F238E27FC236}">
+                <a16:creationId xmlns:a16="http://schemas.microsoft.com/office/drawing/2014/main" id="{756C2EAF-BC8A-44DC-88C5-A261474EE3E7}"/>
+              </a:ext>
+            </a:extLst>
+          </p:cNvPr>
+          <p:cNvSpPr txBox="1"/>
+          <p:nvPr/>
+        </p:nvSpPr>
+        <p:spPr>
+          <a:xfrm>
+            <a:off x="6973703" y="2505670"/>
+            <a:ext cx="3033870" cy="923330"/>
+          </a:xfrm>
+          <a:prstGeom prst="rect">
+            <a:avLst/>
+          </a:prstGeom>
+          <a:noFill/>
+        </p:spPr>
+        <p:txBody>
+          <a:bodyPr wrap="square" rtlCol="0">
+            <a:spAutoFit/>
+          </a:bodyPr>
+          <a:lstStyle/>
+          <a:p>
+            <a:r>
+              <a:rPr lang="en-GB" dirty="0">
+                <a:hlinkClick r:id="rId2"/>
+              </a:rPr>
+              <a:t>https://clara.io/view/b8a8fb8d-cfe7-4e5d-a219-e26f862feb42#</a:t>
+            </a:r>
+            <a:r>
+              <a:rPr lang="en-GB" dirty="0"/>
+              <a:t> -  arrow model</a:t>
+            </a:r>
+          </a:p>
+        </p:txBody>
+      </p:sp>
+      <p:sp>
+        <p:nvSpPr>
+          <p:cNvPr id="2" name="TextBox 1">
+            <a:extLst>
+              <a:ext uri="{FF2B5EF4-FFF2-40B4-BE49-F238E27FC236}">
+                <a16:creationId xmlns:a16="http://schemas.microsoft.com/office/drawing/2014/main" id="{B8E8079B-5301-4E8B-9E59-5384160B5CB8}"/>
+              </a:ext>
+            </a:extLst>
+          </p:cNvPr>
+          <p:cNvSpPr txBox="1"/>
+          <p:nvPr/>
+        </p:nvSpPr>
+        <p:spPr>
+          <a:xfrm>
+            <a:off x="6867083" y="4166273"/>
+            <a:ext cx="3530432" cy="1200329"/>
+          </a:xfrm>
+          <a:prstGeom prst="rect">
+            <a:avLst/>
+          </a:prstGeom>
+          <a:noFill/>
+        </p:spPr>
+        <p:txBody>
+          <a:bodyPr wrap="square" rtlCol="0">
+            <a:spAutoFit/>
+          </a:bodyPr>
+          <a:lstStyle/>
+          <a:p>
+            <a:r>
+              <a:rPr lang="en-GB" dirty="0"/>
+              <a:t>Change in y over change in x diagram - </a:t>
+            </a:r>
+            <a:r>
+              <a:rPr lang="en-GB" dirty="0">
+                <a:hlinkClick r:id="rId3"/>
+              </a:rPr>
+              <a:t>https://www.mathsisfun.com/calculus/derivatives-introduction.html</a:t>
+            </a:r>
+            <a:r>
+              <a:rPr lang="en-GB" dirty="0"/>
+              <a:t> </a:t>
+            </a:r>
+          </a:p>
+        </p:txBody>
+      </p:sp>
+    </p:spTree>
+    <p:extLst>
+      <p:ext uri="{BB962C8B-B14F-4D97-AF65-F5344CB8AC3E}">
+        <p14:creationId xmlns:p14="http://schemas.microsoft.com/office/powerpoint/2010/main" val="3551976893"/>
+      </p:ext>
+    </p:extLst>
+  </p:cSld>
+  <p:clrMapOvr>
+    <a:masterClrMapping/>
+  </p:clrMapOvr>
+</p:sld>
+</file>
+
+<file path=ppt/slides/slide21.xml><?xml version="1.0" encoding="utf-8"?>
+<p:sld xmlns:a="http://schemas.openxmlformats.org/drawingml/2006/main" xmlns:r="http://schemas.openxmlformats.org/officeDocument/2006/relationships" xmlns:p="http://schemas.openxmlformats.org/presentationml/2006/main">
+  <p:cSld>
+    <p:spTree>
+      <p:nvGrpSpPr>
+        <p:cNvPr id="1" name=""/>
+        <p:cNvGrpSpPr/>
+        <p:nvPr/>
+      </p:nvGrpSpPr>
+      <p:grpSpPr>
+        <a:xfrm>
+          <a:off x="0" y="0"/>
+          <a:ext cx="0" cy="0"/>
+          <a:chOff x="0" y="0"/>
+          <a:chExt cx="0" cy="0"/>
+        </a:xfrm>
+      </p:grpSpPr>
+      <p:cxnSp>
+        <p:nvCxnSpPr>
+          <p:cNvPr id="5" name="Straight Connector 4">
+            <a:extLst>
+              <a:ext uri="{FF2B5EF4-FFF2-40B4-BE49-F238E27FC236}">
+                <a16:creationId xmlns:a16="http://schemas.microsoft.com/office/drawing/2014/main" id="{EE6B4757-9867-4F70-92C3-23903FD45972}"/>
+              </a:ext>
+            </a:extLst>
+          </p:cNvPr>
+          <p:cNvCxnSpPr>
+            <a:cxnSpLocks/>
+          </p:cNvCxnSpPr>
+          <p:nvPr/>
+        </p:nvCxnSpPr>
+        <p:spPr>
+          <a:xfrm>
+            <a:off x="1320127" y="1453350"/>
+            <a:ext cx="6503746" cy="0"/>
+          </a:xfrm>
+          <a:prstGeom prst="line">
+            <a:avLst/>
+          </a:prstGeom>
+          <a:ln w="38100">
+            <a:solidFill>
+              <a:schemeClr val="tx1"/>
+            </a:solidFill>
+          </a:ln>
+        </p:spPr>
+        <p:style>
+          <a:lnRef idx="1">
+            <a:schemeClr val="accent1"/>
+          </a:lnRef>
+          <a:fillRef idx="0">
+            <a:schemeClr val="accent1"/>
+          </a:fillRef>
+          <a:effectRef idx="0">
+            <a:schemeClr val="accent1"/>
+          </a:effectRef>
+          <a:fontRef idx="minor">
+            <a:schemeClr val="tx1"/>
+          </a:fontRef>
+        </p:style>
+      </p:cxnSp>
+      <p:cxnSp>
+        <p:nvCxnSpPr>
+          <p:cNvPr id="6" name="Straight Connector 5">
+            <a:extLst>
+              <a:ext uri="{FF2B5EF4-FFF2-40B4-BE49-F238E27FC236}">
+                <a16:creationId xmlns:a16="http://schemas.microsoft.com/office/drawing/2014/main" id="{DC8A5B46-5619-4897-A83E-ED87B07F6646}"/>
+              </a:ext>
+            </a:extLst>
+          </p:cNvPr>
+          <p:cNvCxnSpPr>
+            <a:cxnSpLocks/>
+          </p:cNvCxnSpPr>
+          <p:nvPr/>
+        </p:nvCxnSpPr>
+        <p:spPr>
+          <a:xfrm>
+            <a:off x="2186082" y="1065791"/>
+            <a:ext cx="0" cy="2107359"/>
+          </a:xfrm>
+          <a:prstGeom prst="line">
+            <a:avLst/>
+          </a:prstGeom>
+          <a:ln w="38100">
+            <a:solidFill>
+              <a:schemeClr val="tx1"/>
+            </a:solidFill>
+          </a:ln>
+        </p:spPr>
+        <p:style>
+          <a:lnRef idx="1">
+            <a:schemeClr val="accent1"/>
+          </a:lnRef>
+          <a:fillRef idx="0">
+            <a:schemeClr val="accent1"/>
+          </a:fillRef>
+          <a:effectRef idx="0">
+            <a:schemeClr val="accent1"/>
+          </a:effectRef>
+          <a:fontRef idx="minor">
+            <a:schemeClr val="tx1"/>
+          </a:fontRef>
+        </p:style>
+      </p:cxnSp>
+      <p:cxnSp>
+        <p:nvCxnSpPr>
+          <p:cNvPr id="9" name="Straight Connector 8">
+            <a:extLst>
+              <a:ext uri="{FF2B5EF4-FFF2-40B4-BE49-F238E27FC236}">
+                <a16:creationId xmlns:a16="http://schemas.microsoft.com/office/drawing/2014/main" id="{2BE7E7AA-05A6-4BED-BE58-540FED495477}"/>
+              </a:ext>
+            </a:extLst>
+          </p:cNvPr>
+          <p:cNvCxnSpPr>
+            <a:cxnSpLocks/>
+          </p:cNvCxnSpPr>
+          <p:nvPr/>
+        </p:nvCxnSpPr>
+        <p:spPr>
+          <a:xfrm>
+            <a:off x="3168103" y="1065790"/>
+            <a:ext cx="0" cy="2107360"/>
+          </a:xfrm>
+          <a:prstGeom prst="line">
+            <a:avLst/>
+          </a:prstGeom>
+          <a:ln w="38100">
+            <a:solidFill>
+              <a:schemeClr val="tx1"/>
+            </a:solidFill>
+          </a:ln>
+        </p:spPr>
+        <p:style>
+          <a:lnRef idx="1">
+            <a:schemeClr val="accent1"/>
+          </a:lnRef>
+          <a:fillRef idx="0">
+            <a:schemeClr val="accent1"/>
+          </a:fillRef>
+          <a:effectRef idx="0">
+            <a:schemeClr val="accent1"/>
+          </a:effectRef>
+          <a:fontRef idx="minor">
+            <a:schemeClr val="tx1"/>
+          </a:fontRef>
+        </p:style>
+      </p:cxnSp>
+      <p:cxnSp>
+        <p:nvCxnSpPr>
+          <p:cNvPr id="10" name="Straight Connector 9">
+            <a:extLst>
+              <a:ext uri="{FF2B5EF4-FFF2-40B4-BE49-F238E27FC236}">
+                <a16:creationId xmlns:a16="http://schemas.microsoft.com/office/drawing/2014/main" id="{1902FA23-3127-46D8-BF4D-7D23D847974B}"/>
+              </a:ext>
+            </a:extLst>
+          </p:cNvPr>
+          <p:cNvCxnSpPr>
+            <a:cxnSpLocks/>
+          </p:cNvCxnSpPr>
+          <p:nvPr/>
+        </p:nvCxnSpPr>
+        <p:spPr>
+          <a:xfrm>
+            <a:off x="4191505" y="1065789"/>
+            <a:ext cx="0" cy="2107361"/>
+          </a:xfrm>
+          <a:prstGeom prst="line">
+            <a:avLst/>
+          </a:prstGeom>
+          <a:ln w="38100">
+            <a:solidFill>
+              <a:schemeClr val="tx1"/>
+            </a:solidFill>
+          </a:ln>
+        </p:spPr>
+        <p:style>
+          <a:lnRef idx="1">
+            <a:schemeClr val="accent1"/>
+          </a:lnRef>
+          <a:fillRef idx="0">
+            <a:schemeClr val="accent1"/>
+          </a:fillRef>
+          <a:effectRef idx="0">
+            <a:schemeClr val="accent1"/>
+          </a:effectRef>
+          <a:fontRef idx="minor">
+            <a:schemeClr val="tx1"/>
+          </a:fontRef>
+        </p:style>
+      </p:cxnSp>
+      <p:cxnSp>
+        <p:nvCxnSpPr>
+          <p:cNvPr id="11" name="Straight Connector 10">
+            <a:extLst>
+              <a:ext uri="{FF2B5EF4-FFF2-40B4-BE49-F238E27FC236}">
+                <a16:creationId xmlns:a16="http://schemas.microsoft.com/office/drawing/2014/main" id="{50A0EEBC-79F1-4567-84DC-9E38BE73EE26}"/>
+              </a:ext>
+            </a:extLst>
+          </p:cNvPr>
+          <p:cNvCxnSpPr>
+            <a:cxnSpLocks/>
+          </p:cNvCxnSpPr>
+          <p:nvPr/>
+        </p:nvCxnSpPr>
+        <p:spPr>
+          <a:xfrm>
+            <a:off x="5227017" y="1065789"/>
+            <a:ext cx="0" cy="2107361"/>
+          </a:xfrm>
+          <a:prstGeom prst="line">
+            <a:avLst/>
+          </a:prstGeom>
+          <a:ln w="38100">
+            <a:solidFill>
+              <a:schemeClr val="tx1"/>
+            </a:solidFill>
+          </a:ln>
+        </p:spPr>
+        <p:style>
+          <a:lnRef idx="1">
+            <a:schemeClr val="accent1"/>
+          </a:lnRef>
+          <a:fillRef idx="0">
+            <a:schemeClr val="accent1"/>
+          </a:fillRef>
+          <a:effectRef idx="0">
+            <a:schemeClr val="accent1"/>
+          </a:effectRef>
+          <a:fontRef idx="minor">
+            <a:schemeClr val="tx1"/>
+          </a:fontRef>
+        </p:style>
+      </p:cxnSp>
+      <p:sp>
+        <p:nvSpPr>
+          <p:cNvPr id="12" name="TextBox 11">
+            <a:extLst>
+              <a:ext uri="{FF2B5EF4-FFF2-40B4-BE49-F238E27FC236}">
+                <a16:creationId xmlns:a16="http://schemas.microsoft.com/office/drawing/2014/main" id="{1F1CD37E-1905-4FB0-BFF3-5122297A2E0D}"/>
+              </a:ext>
+            </a:extLst>
+          </p:cNvPr>
+          <p:cNvSpPr txBox="1"/>
+          <p:nvPr/>
+        </p:nvSpPr>
+        <p:spPr>
+          <a:xfrm>
+            <a:off x="1271685" y="1105681"/>
+            <a:ext cx="956787" cy="307777"/>
+          </a:xfrm>
+          <a:prstGeom prst="rect">
+            <a:avLst/>
+          </a:prstGeom>
+          <a:noFill/>
+        </p:spPr>
+        <p:txBody>
+          <a:bodyPr wrap="square" rtlCol="0">
+            <a:spAutoFit/>
+          </a:bodyPr>
+          <a:lstStyle/>
+          <a:p>
+            <a:r>
+              <a:rPr lang="en-GB" sz="1400" dirty="0"/>
+              <a:t>Height cm</a:t>
+            </a:r>
+          </a:p>
+        </p:txBody>
+      </p:sp>
+      <p:sp>
+        <p:nvSpPr>
+          <p:cNvPr id="13" name="TextBox 12">
+            <a:extLst>
+              <a:ext uri="{FF2B5EF4-FFF2-40B4-BE49-F238E27FC236}">
+                <a16:creationId xmlns:a16="http://schemas.microsoft.com/office/drawing/2014/main" id="{0AD01AC9-C7A0-45DF-9769-BCC5BEF0E072}"/>
+              </a:ext>
+            </a:extLst>
+          </p:cNvPr>
+          <p:cNvSpPr txBox="1"/>
+          <p:nvPr/>
+        </p:nvSpPr>
+        <p:spPr>
+          <a:xfrm>
+            <a:off x="2319304" y="1105680"/>
+            <a:ext cx="823565" cy="307777"/>
+          </a:xfrm>
+          <a:prstGeom prst="rect">
+            <a:avLst/>
+          </a:prstGeom>
+          <a:noFill/>
+        </p:spPr>
+        <p:txBody>
+          <a:bodyPr wrap="square" rtlCol="0">
+            <a:spAutoFit/>
+          </a:bodyPr>
+          <a:lstStyle/>
+          <a:p>
+            <a:r>
+              <a:rPr lang="en-GB" sz="1400" dirty="0"/>
+              <a:t>Time s</a:t>
+            </a:r>
+          </a:p>
+        </p:txBody>
+      </p:sp>
+      <p:sp>
+        <p:nvSpPr>
+          <p:cNvPr id="14" name="TextBox 13">
+            <a:extLst>
+              <a:ext uri="{FF2B5EF4-FFF2-40B4-BE49-F238E27FC236}">
+                <a16:creationId xmlns:a16="http://schemas.microsoft.com/office/drawing/2014/main" id="{315AC165-89A8-4F8F-A739-D6D0200E8AF0}"/>
+              </a:ext>
+            </a:extLst>
+          </p:cNvPr>
+          <p:cNvSpPr txBox="1"/>
+          <p:nvPr/>
+        </p:nvSpPr>
+        <p:spPr>
+          <a:xfrm>
+            <a:off x="3301324" y="1105679"/>
+            <a:ext cx="823565" cy="307777"/>
+          </a:xfrm>
+          <a:prstGeom prst="rect">
+            <a:avLst/>
+          </a:prstGeom>
+          <a:noFill/>
+        </p:spPr>
+        <p:txBody>
+          <a:bodyPr wrap="square" rtlCol="0">
+            <a:spAutoFit/>
+          </a:bodyPr>
+          <a:lstStyle/>
+          <a:p>
+            <a:r>
+              <a:rPr lang="en-GB" sz="1400" dirty="0"/>
+              <a:t>Time s</a:t>
+            </a:r>
+          </a:p>
+        </p:txBody>
+      </p:sp>
+      <p:sp>
+        <p:nvSpPr>
+          <p:cNvPr id="15" name="TextBox 14">
+            <a:extLst>
+              <a:ext uri="{FF2B5EF4-FFF2-40B4-BE49-F238E27FC236}">
+                <a16:creationId xmlns:a16="http://schemas.microsoft.com/office/drawing/2014/main" id="{67E811E5-13CA-4747-BB41-8BD7BFB004A9}"/>
+              </a:ext>
+            </a:extLst>
+          </p:cNvPr>
+          <p:cNvSpPr txBox="1"/>
+          <p:nvPr/>
+        </p:nvSpPr>
+        <p:spPr>
+          <a:xfrm>
+            <a:off x="4324726" y="1105680"/>
+            <a:ext cx="823565" cy="307777"/>
+          </a:xfrm>
+          <a:prstGeom prst="rect">
+            <a:avLst/>
+          </a:prstGeom>
+          <a:noFill/>
+        </p:spPr>
+        <p:txBody>
+          <a:bodyPr wrap="square" rtlCol="0">
+            <a:spAutoFit/>
+          </a:bodyPr>
+          <a:lstStyle/>
+          <a:p>
+            <a:r>
+              <a:rPr lang="en-GB" sz="1400" dirty="0"/>
+              <a:t>Time s</a:t>
+            </a:r>
+          </a:p>
+        </p:txBody>
+      </p:sp>
+      <p:sp>
+        <p:nvSpPr>
+          <p:cNvPr id="17" name="TextBox 16">
+            <a:extLst>
+              <a:ext uri="{FF2B5EF4-FFF2-40B4-BE49-F238E27FC236}">
+                <a16:creationId xmlns:a16="http://schemas.microsoft.com/office/drawing/2014/main" id="{8C675AAB-D99A-4199-A754-2F0A3123F89F}"/>
+              </a:ext>
+            </a:extLst>
+          </p:cNvPr>
+          <p:cNvSpPr txBox="1"/>
+          <p:nvPr/>
+        </p:nvSpPr>
+        <p:spPr>
+          <a:xfrm>
+            <a:off x="5227017" y="1115289"/>
+            <a:ext cx="1409953" cy="307777"/>
+          </a:xfrm>
+          <a:prstGeom prst="rect">
+            <a:avLst/>
+          </a:prstGeom>
+          <a:noFill/>
+        </p:spPr>
+        <p:txBody>
+          <a:bodyPr wrap="square" rtlCol="0">
+            <a:spAutoFit/>
+          </a:bodyPr>
+          <a:lstStyle/>
+          <a:p>
+            <a:r>
+              <a:rPr lang="en-GB" sz="1400" dirty="0"/>
+              <a:t>Average Time s</a:t>
+            </a:r>
+          </a:p>
+        </p:txBody>
+      </p:sp>
+      <p:sp>
+        <p:nvSpPr>
+          <p:cNvPr id="20" name="TextBox 19">
+            <a:extLst>
+              <a:ext uri="{FF2B5EF4-FFF2-40B4-BE49-F238E27FC236}">
+                <a16:creationId xmlns:a16="http://schemas.microsoft.com/office/drawing/2014/main" id="{3C09D871-2279-4343-932D-6D97F622956B}"/>
+              </a:ext>
+            </a:extLst>
+          </p:cNvPr>
+          <p:cNvSpPr txBox="1"/>
+          <p:nvPr/>
+        </p:nvSpPr>
+        <p:spPr>
+          <a:xfrm>
+            <a:off x="3168103" y="577901"/>
+            <a:ext cx="1409953" cy="338554"/>
+          </a:xfrm>
+          <a:prstGeom prst="rect">
+            <a:avLst/>
+          </a:prstGeom>
+          <a:noFill/>
+        </p:spPr>
+        <p:txBody>
+          <a:bodyPr wrap="square" rtlCol="0">
+            <a:spAutoFit/>
+          </a:bodyPr>
+          <a:lstStyle/>
+          <a:p>
+            <a:r>
+              <a:rPr lang="en-GB" sz="1600" b="1" dirty="0"/>
+              <a:t>Example Table</a:t>
+            </a:r>
+          </a:p>
+        </p:txBody>
+      </p:sp>
+      <p:sp>
+        <p:nvSpPr>
+          <p:cNvPr id="21" name="TextBox 20">
+            <a:extLst>
+              <a:ext uri="{FF2B5EF4-FFF2-40B4-BE49-F238E27FC236}">
+                <a16:creationId xmlns:a16="http://schemas.microsoft.com/office/drawing/2014/main" id="{192067E9-EA1D-4E7D-AE01-1ECF784AD320}"/>
+              </a:ext>
+            </a:extLst>
+          </p:cNvPr>
+          <p:cNvSpPr txBox="1"/>
+          <p:nvPr/>
+        </p:nvSpPr>
+        <p:spPr>
+          <a:xfrm>
+            <a:off x="1529299" y="1552361"/>
+            <a:ext cx="441558" cy="307777"/>
+          </a:xfrm>
+          <a:prstGeom prst="rect">
+            <a:avLst/>
+          </a:prstGeom>
+          <a:noFill/>
+        </p:spPr>
+        <p:txBody>
+          <a:bodyPr wrap="square" rtlCol="0">
+            <a:spAutoFit/>
+          </a:bodyPr>
+          <a:lstStyle/>
+          <a:p>
+            <a:r>
+              <a:rPr lang="en-GB" sz="1400" dirty="0"/>
+              <a:t>0.1</a:t>
+            </a:r>
+          </a:p>
+        </p:txBody>
+      </p:sp>
+      <p:sp>
+        <p:nvSpPr>
+          <p:cNvPr id="22" name="TextBox 21">
+            <a:extLst>
+              <a:ext uri="{FF2B5EF4-FFF2-40B4-BE49-F238E27FC236}">
+                <a16:creationId xmlns:a16="http://schemas.microsoft.com/office/drawing/2014/main" id="{150C7FA2-6454-41E4-AD2B-34627E9765F3}"/>
+              </a:ext>
+            </a:extLst>
+          </p:cNvPr>
+          <p:cNvSpPr txBox="1"/>
+          <p:nvPr/>
+        </p:nvSpPr>
+        <p:spPr>
+          <a:xfrm>
+            <a:off x="1529299" y="1860138"/>
+            <a:ext cx="441558" cy="307777"/>
+          </a:xfrm>
+          <a:prstGeom prst="rect">
+            <a:avLst/>
+          </a:prstGeom>
+          <a:noFill/>
+        </p:spPr>
+        <p:txBody>
+          <a:bodyPr wrap="square" rtlCol="0">
+            <a:spAutoFit/>
+          </a:bodyPr>
+          <a:lstStyle/>
+          <a:p>
+            <a:r>
+              <a:rPr lang="en-GB" sz="1400" dirty="0"/>
+              <a:t>0.2</a:t>
+            </a:r>
+          </a:p>
+        </p:txBody>
+      </p:sp>
+      <p:sp>
+        <p:nvSpPr>
+          <p:cNvPr id="23" name="TextBox 22">
+            <a:extLst>
+              <a:ext uri="{FF2B5EF4-FFF2-40B4-BE49-F238E27FC236}">
+                <a16:creationId xmlns:a16="http://schemas.microsoft.com/office/drawing/2014/main" id="{73C1EACD-0EF3-4EA6-98A5-E2C92B2BDF38}"/>
+              </a:ext>
+            </a:extLst>
+          </p:cNvPr>
+          <p:cNvSpPr txBox="1"/>
+          <p:nvPr/>
+        </p:nvSpPr>
+        <p:spPr>
+          <a:xfrm>
+            <a:off x="1520977" y="2167915"/>
+            <a:ext cx="441558" cy="307777"/>
+          </a:xfrm>
+          <a:prstGeom prst="rect">
+            <a:avLst/>
+          </a:prstGeom>
+          <a:noFill/>
+        </p:spPr>
+        <p:txBody>
+          <a:bodyPr wrap="square" rtlCol="0">
+            <a:spAutoFit/>
+          </a:bodyPr>
+          <a:lstStyle/>
+          <a:p>
+            <a:r>
+              <a:rPr lang="en-GB" sz="1400" dirty="0"/>
+              <a:t>0.3</a:t>
+            </a:r>
+          </a:p>
+        </p:txBody>
+      </p:sp>
+      <p:sp>
+        <p:nvSpPr>
+          <p:cNvPr id="24" name="TextBox 23">
+            <a:extLst>
+              <a:ext uri="{FF2B5EF4-FFF2-40B4-BE49-F238E27FC236}">
+                <a16:creationId xmlns:a16="http://schemas.microsoft.com/office/drawing/2014/main" id="{B09967C1-E7FE-46E1-8799-4EC7C1874E3B}"/>
+              </a:ext>
+            </a:extLst>
+          </p:cNvPr>
+          <p:cNvSpPr txBox="1"/>
+          <p:nvPr/>
+        </p:nvSpPr>
+        <p:spPr>
+          <a:xfrm>
+            <a:off x="1536366" y="2475692"/>
+            <a:ext cx="441558" cy="307777"/>
+          </a:xfrm>
+          <a:prstGeom prst="rect">
+            <a:avLst/>
+          </a:prstGeom>
+          <a:noFill/>
+        </p:spPr>
+        <p:txBody>
+          <a:bodyPr wrap="square" rtlCol="0">
+            <a:spAutoFit/>
+          </a:bodyPr>
+          <a:lstStyle/>
+          <a:p>
+            <a:r>
+              <a:rPr lang="en-GB" sz="1400" dirty="0"/>
+              <a:t>0.4</a:t>
+            </a:r>
+          </a:p>
+        </p:txBody>
+      </p:sp>
+      <p:sp>
+        <p:nvSpPr>
+          <p:cNvPr id="25" name="TextBox 24">
+            <a:extLst>
+              <a:ext uri="{FF2B5EF4-FFF2-40B4-BE49-F238E27FC236}">
+                <a16:creationId xmlns:a16="http://schemas.microsoft.com/office/drawing/2014/main" id="{FF763D0D-D7F6-445F-ADF0-8237F9418939}"/>
+              </a:ext>
+            </a:extLst>
+          </p:cNvPr>
+          <p:cNvSpPr txBox="1"/>
+          <p:nvPr/>
+        </p:nvSpPr>
+        <p:spPr>
+          <a:xfrm>
+            <a:off x="1536366" y="2783469"/>
+            <a:ext cx="441558" cy="307777"/>
+          </a:xfrm>
+          <a:prstGeom prst="rect">
+            <a:avLst/>
+          </a:prstGeom>
+          <a:noFill/>
+        </p:spPr>
+        <p:txBody>
+          <a:bodyPr wrap="square" rtlCol="0">
+            <a:spAutoFit/>
+          </a:bodyPr>
+          <a:lstStyle/>
+          <a:p>
+            <a:r>
+              <a:rPr lang="en-GB" sz="1400" dirty="0"/>
+              <a:t>0.5</a:t>
+            </a:r>
+          </a:p>
+        </p:txBody>
+      </p:sp>
+      <p:cxnSp>
+        <p:nvCxnSpPr>
+          <p:cNvPr id="32" name="Connector: Curved 31">
+            <a:extLst>
+              <a:ext uri="{FF2B5EF4-FFF2-40B4-BE49-F238E27FC236}">
+                <a16:creationId xmlns:a16="http://schemas.microsoft.com/office/drawing/2014/main" id="{169D8960-1D0E-4CF6-B378-4E0D77DEC4DD}"/>
+              </a:ext>
+            </a:extLst>
+          </p:cNvPr>
+          <p:cNvCxnSpPr>
+            <a:cxnSpLocks/>
+          </p:cNvCxnSpPr>
+          <p:nvPr/>
+        </p:nvCxnSpPr>
+        <p:spPr>
+          <a:xfrm>
+            <a:off x="8037327" y="1342275"/>
+            <a:ext cx="963356" cy="419632"/>
+          </a:xfrm>
+          <a:prstGeom prst="curvedConnector3">
+            <a:avLst/>
+          </a:prstGeom>
+          <a:ln w="28575">
+            <a:solidFill>
+              <a:schemeClr val="tx1"/>
+            </a:solidFill>
+            <a:tailEnd type="triangle"/>
+          </a:ln>
+        </p:spPr>
+        <p:style>
+          <a:lnRef idx="1">
+            <a:schemeClr val="accent1"/>
+          </a:lnRef>
+          <a:fillRef idx="0">
+            <a:schemeClr val="accent1"/>
+          </a:fillRef>
+          <a:effectRef idx="0">
+            <a:schemeClr val="accent1"/>
+          </a:effectRef>
+          <a:fontRef idx="minor">
+            <a:schemeClr val="tx1"/>
+          </a:fontRef>
+        </p:style>
+      </p:cxnSp>
+      <p:sp>
+        <p:nvSpPr>
+          <p:cNvPr id="34" name="TextBox 33">
+            <a:extLst>
+              <a:ext uri="{FF2B5EF4-FFF2-40B4-BE49-F238E27FC236}">
+                <a16:creationId xmlns:a16="http://schemas.microsoft.com/office/drawing/2014/main" id="{FAB8472B-C53B-40F3-9526-B3E56C940E15}"/>
+              </a:ext>
+            </a:extLst>
+          </p:cNvPr>
+          <p:cNvSpPr txBox="1"/>
+          <p:nvPr/>
+        </p:nvSpPr>
+        <p:spPr>
+          <a:xfrm>
+            <a:off x="9036008" y="1423354"/>
+            <a:ext cx="1532074" cy="954107"/>
+          </a:xfrm>
+          <a:prstGeom prst="rect">
+            <a:avLst/>
+          </a:prstGeom>
+          <a:noFill/>
+        </p:spPr>
+        <p:txBody>
+          <a:bodyPr wrap="square" rtlCol="0">
+            <a:spAutoFit/>
+          </a:bodyPr>
+          <a:lstStyle/>
+          <a:p>
+            <a:r>
+              <a:rPr lang="en-GB" sz="1400" dirty="0"/>
+              <a:t>Remember to put the unit in the header not in each line</a:t>
+            </a:r>
+          </a:p>
+        </p:txBody>
+      </p:sp>
+      <p:sp>
+        <p:nvSpPr>
+          <p:cNvPr id="35" name="TextBox 34">
+            <a:extLst>
+              <a:ext uri="{FF2B5EF4-FFF2-40B4-BE49-F238E27FC236}">
+                <a16:creationId xmlns:a16="http://schemas.microsoft.com/office/drawing/2014/main" id="{0F9FB4E2-AB6D-42C8-9C4B-6D11A44C0ADD}"/>
+              </a:ext>
+            </a:extLst>
+          </p:cNvPr>
+          <p:cNvSpPr txBox="1"/>
+          <p:nvPr/>
+        </p:nvSpPr>
+        <p:spPr>
+          <a:xfrm>
+            <a:off x="2408635" y="1860138"/>
+            <a:ext cx="577301" cy="307777"/>
+          </a:xfrm>
+          <a:prstGeom prst="rect">
+            <a:avLst/>
+          </a:prstGeom>
+          <a:noFill/>
+        </p:spPr>
+        <p:txBody>
+          <a:bodyPr wrap="square" rtlCol="0">
+            <a:spAutoFit/>
+          </a:bodyPr>
+          <a:lstStyle/>
+          <a:p>
+            <a:r>
+              <a:rPr lang="en-GB" sz="1400" dirty="0"/>
+              <a:t>17.2</a:t>
+            </a:r>
+          </a:p>
+        </p:txBody>
+      </p:sp>
+      <p:sp>
+        <p:nvSpPr>
+          <p:cNvPr id="36" name="TextBox 35">
+            <a:extLst>
+              <a:ext uri="{FF2B5EF4-FFF2-40B4-BE49-F238E27FC236}">
+                <a16:creationId xmlns:a16="http://schemas.microsoft.com/office/drawing/2014/main" id="{5F935EF6-F023-43B2-89BC-FE0A08C9E70E}"/>
+              </a:ext>
+            </a:extLst>
+          </p:cNvPr>
+          <p:cNvSpPr txBox="1"/>
+          <p:nvPr/>
+        </p:nvSpPr>
+        <p:spPr>
+          <a:xfrm>
+            <a:off x="3441626" y="1854082"/>
+            <a:ext cx="570489" cy="307777"/>
+          </a:xfrm>
+          <a:prstGeom prst="rect">
+            <a:avLst/>
+          </a:prstGeom>
+          <a:noFill/>
+        </p:spPr>
+        <p:txBody>
+          <a:bodyPr wrap="square" rtlCol="0">
+            <a:spAutoFit/>
+          </a:bodyPr>
+          <a:lstStyle/>
+          <a:p>
+            <a:r>
+              <a:rPr lang="en-GB" sz="1400" dirty="0"/>
+              <a:t>18.1</a:t>
+            </a:r>
+          </a:p>
+        </p:txBody>
+      </p:sp>
+      <p:sp>
+        <p:nvSpPr>
+          <p:cNvPr id="37" name="TextBox 36">
+            <a:extLst>
+              <a:ext uri="{FF2B5EF4-FFF2-40B4-BE49-F238E27FC236}">
+                <a16:creationId xmlns:a16="http://schemas.microsoft.com/office/drawing/2014/main" id="{4A57F8ED-538E-4B98-A347-78B798E81459}"/>
+              </a:ext>
+            </a:extLst>
+          </p:cNvPr>
+          <p:cNvSpPr txBox="1"/>
+          <p:nvPr/>
+        </p:nvSpPr>
+        <p:spPr>
+          <a:xfrm>
+            <a:off x="4476373" y="1860138"/>
+            <a:ext cx="559143" cy="307777"/>
+          </a:xfrm>
+          <a:prstGeom prst="rect">
+            <a:avLst/>
+          </a:prstGeom>
+          <a:noFill/>
+        </p:spPr>
+        <p:txBody>
+          <a:bodyPr wrap="square" rtlCol="0">
+            <a:spAutoFit/>
+          </a:bodyPr>
+          <a:lstStyle/>
+          <a:p>
+            <a:r>
+              <a:rPr lang="en-GB" sz="1400" dirty="0"/>
+              <a:t>29.1</a:t>
+            </a:r>
+          </a:p>
+        </p:txBody>
+      </p:sp>
+      <p:cxnSp>
+        <p:nvCxnSpPr>
+          <p:cNvPr id="39" name="Connector: Curved 38">
+            <a:extLst>
+              <a:ext uri="{FF2B5EF4-FFF2-40B4-BE49-F238E27FC236}">
+                <a16:creationId xmlns:a16="http://schemas.microsoft.com/office/drawing/2014/main" id="{FFA977E7-E917-4291-A3D5-04BBDF8CBA9F}"/>
+              </a:ext>
+            </a:extLst>
+          </p:cNvPr>
+          <p:cNvCxnSpPr>
+            <a:cxnSpLocks/>
+          </p:cNvCxnSpPr>
+          <p:nvPr/>
+        </p:nvCxnSpPr>
+        <p:spPr>
+          <a:xfrm>
+            <a:off x="6586007" y="2119198"/>
+            <a:ext cx="1414489" cy="914936"/>
+          </a:xfrm>
+          <a:prstGeom prst="curvedConnector3">
+            <a:avLst/>
+          </a:prstGeom>
+          <a:ln w="28575">
+            <a:solidFill>
+              <a:schemeClr val="tx1"/>
+            </a:solidFill>
+            <a:tailEnd type="triangle"/>
+          </a:ln>
+        </p:spPr>
+        <p:style>
+          <a:lnRef idx="1">
+            <a:schemeClr val="accent1"/>
+          </a:lnRef>
+          <a:fillRef idx="0">
+            <a:schemeClr val="accent1"/>
+          </a:fillRef>
+          <a:effectRef idx="0">
+            <a:schemeClr val="accent1"/>
+          </a:effectRef>
+          <a:fontRef idx="minor">
+            <a:schemeClr val="tx1"/>
+          </a:fontRef>
+        </p:style>
+      </p:cxnSp>
+      <p:sp>
+        <p:nvSpPr>
+          <p:cNvPr id="41" name="TextBox 40">
+            <a:extLst>
+              <a:ext uri="{FF2B5EF4-FFF2-40B4-BE49-F238E27FC236}">
+                <a16:creationId xmlns:a16="http://schemas.microsoft.com/office/drawing/2014/main" id="{49E4AEEA-E2A0-4864-B8F2-7C2293540D13}"/>
+              </a:ext>
+            </a:extLst>
+          </p:cNvPr>
+          <p:cNvSpPr txBox="1"/>
+          <p:nvPr/>
+        </p:nvSpPr>
+        <p:spPr>
+          <a:xfrm>
+            <a:off x="8000496" y="2783469"/>
+            <a:ext cx="2235536" cy="954107"/>
+          </a:xfrm>
+          <a:prstGeom prst="rect">
+            <a:avLst/>
+          </a:prstGeom>
+          <a:noFill/>
+        </p:spPr>
+        <p:txBody>
+          <a:bodyPr wrap="square" rtlCol="0">
+            <a:spAutoFit/>
+          </a:bodyPr>
+          <a:lstStyle/>
+          <a:p>
+            <a:r>
+              <a:rPr lang="en-GB" sz="1400" dirty="0"/>
+              <a:t>Once you have collected your results, it is important to remove and repeat any anomalous results</a:t>
+            </a:r>
+          </a:p>
+        </p:txBody>
+      </p:sp>
+      <p:cxnSp>
+        <p:nvCxnSpPr>
+          <p:cNvPr id="26" name="Straight Connector 25">
+            <a:extLst>
+              <a:ext uri="{FF2B5EF4-FFF2-40B4-BE49-F238E27FC236}">
+                <a16:creationId xmlns:a16="http://schemas.microsoft.com/office/drawing/2014/main" id="{36C8558B-CC46-40E7-B3CB-98743B2A8715}"/>
+              </a:ext>
+            </a:extLst>
+          </p:cNvPr>
+          <p:cNvCxnSpPr>
+            <a:cxnSpLocks/>
+          </p:cNvCxnSpPr>
+          <p:nvPr/>
+        </p:nvCxnSpPr>
+        <p:spPr>
+          <a:xfrm>
+            <a:off x="6475486" y="1065789"/>
+            <a:ext cx="0" cy="2107361"/>
+          </a:xfrm>
+          <a:prstGeom prst="line">
+            <a:avLst/>
+          </a:prstGeom>
+          <a:ln w="38100">
+            <a:solidFill>
+              <a:schemeClr val="tx1"/>
+            </a:solidFill>
+          </a:ln>
+        </p:spPr>
+        <p:style>
+          <a:lnRef idx="1">
+            <a:schemeClr val="accent1"/>
+          </a:lnRef>
+          <a:fillRef idx="0">
+            <a:schemeClr val="accent1"/>
+          </a:fillRef>
+          <a:effectRef idx="0">
+            <a:schemeClr val="accent1"/>
+          </a:effectRef>
+          <a:fontRef idx="minor">
+            <a:schemeClr val="tx1"/>
+          </a:fontRef>
+        </p:style>
+      </p:cxnSp>
+      <p:sp>
+        <p:nvSpPr>
+          <p:cNvPr id="28" name="TextBox 27">
+            <a:extLst>
+              <a:ext uri="{FF2B5EF4-FFF2-40B4-BE49-F238E27FC236}">
+                <a16:creationId xmlns:a16="http://schemas.microsoft.com/office/drawing/2014/main" id="{24722548-3582-4E40-93A9-FC90CB48C11A}"/>
+              </a:ext>
+            </a:extLst>
+          </p:cNvPr>
+          <p:cNvSpPr txBox="1"/>
+          <p:nvPr/>
+        </p:nvSpPr>
+        <p:spPr>
+          <a:xfrm>
+            <a:off x="6502231" y="1105678"/>
+            <a:ext cx="1321640" cy="307777"/>
+          </a:xfrm>
+          <a:prstGeom prst="rect">
+            <a:avLst/>
+          </a:prstGeom>
+          <a:noFill/>
+        </p:spPr>
+        <p:txBody>
+          <a:bodyPr wrap="square" rtlCol="0">
+            <a:spAutoFit/>
+          </a:bodyPr>
+          <a:lstStyle/>
+          <a:p>
+            <a:r>
+              <a:rPr lang="en-GB" sz="1400" dirty="0"/>
+              <a:t>Velocity (m/s)</a:t>
+            </a:r>
+          </a:p>
+        </p:txBody>
+      </p:sp>
+    </p:spTree>
+    <p:extLst>
+      <p:ext uri="{BB962C8B-B14F-4D97-AF65-F5344CB8AC3E}">
+        <p14:creationId xmlns:p14="http://schemas.microsoft.com/office/powerpoint/2010/main" val="3707381430"/>
       </p:ext>
     </p:extLst>
   </p:cSld>

</xml_diff>

<commit_message>
Marking for grading system complete
</commit_message>
<xml_diff>
--- a/Determination of g diagram.pptx
+++ b/Determination of g diagram.pptx
@@ -281,7 +281,7 @@
           <a:p>
             <a:fld id="{40AE047B-88A8-4E73-BFC2-E0D791C9FE6D}" type="datetimeFigureOut">
               <a:rPr lang="en-GB" smtClean="0"/>
-              <a:t>28/04/2022</a:t>
+              <a:t>29/04/2022</a:t>
             </a:fld>
             <a:endParaRPr lang="en-GB"/>
           </a:p>
@@ -481,7 +481,7 @@
           <a:p>
             <a:fld id="{40AE047B-88A8-4E73-BFC2-E0D791C9FE6D}" type="datetimeFigureOut">
               <a:rPr lang="en-GB" smtClean="0"/>
-              <a:t>28/04/2022</a:t>
+              <a:t>29/04/2022</a:t>
             </a:fld>
             <a:endParaRPr lang="en-GB"/>
           </a:p>
@@ -691,7 +691,7 @@
           <a:p>
             <a:fld id="{40AE047B-88A8-4E73-BFC2-E0D791C9FE6D}" type="datetimeFigureOut">
               <a:rPr lang="en-GB" smtClean="0"/>
-              <a:t>28/04/2022</a:t>
+              <a:t>29/04/2022</a:t>
             </a:fld>
             <a:endParaRPr lang="en-GB"/>
           </a:p>
@@ -891,7 +891,7 @@
           <a:p>
             <a:fld id="{40AE047B-88A8-4E73-BFC2-E0D791C9FE6D}" type="datetimeFigureOut">
               <a:rPr lang="en-GB" smtClean="0"/>
-              <a:t>28/04/2022</a:t>
+              <a:t>29/04/2022</a:t>
             </a:fld>
             <a:endParaRPr lang="en-GB"/>
           </a:p>
@@ -1167,7 +1167,7 @@
           <a:p>
             <a:fld id="{40AE047B-88A8-4E73-BFC2-E0D791C9FE6D}" type="datetimeFigureOut">
               <a:rPr lang="en-GB" smtClean="0"/>
-              <a:t>28/04/2022</a:t>
+              <a:t>29/04/2022</a:t>
             </a:fld>
             <a:endParaRPr lang="en-GB"/>
           </a:p>
@@ -1435,7 +1435,7 @@
           <a:p>
             <a:fld id="{40AE047B-88A8-4E73-BFC2-E0D791C9FE6D}" type="datetimeFigureOut">
               <a:rPr lang="en-GB" smtClean="0"/>
-              <a:t>28/04/2022</a:t>
+              <a:t>29/04/2022</a:t>
             </a:fld>
             <a:endParaRPr lang="en-GB"/>
           </a:p>
@@ -1850,7 +1850,7 @@
           <a:p>
             <a:fld id="{40AE047B-88A8-4E73-BFC2-E0D791C9FE6D}" type="datetimeFigureOut">
               <a:rPr lang="en-GB" smtClean="0"/>
-              <a:t>28/04/2022</a:t>
+              <a:t>29/04/2022</a:t>
             </a:fld>
             <a:endParaRPr lang="en-GB"/>
           </a:p>
@@ -1992,7 +1992,7 @@
           <a:p>
             <a:fld id="{40AE047B-88A8-4E73-BFC2-E0D791C9FE6D}" type="datetimeFigureOut">
               <a:rPr lang="en-GB" smtClean="0"/>
-              <a:t>28/04/2022</a:t>
+              <a:t>29/04/2022</a:t>
             </a:fld>
             <a:endParaRPr lang="en-GB"/>
           </a:p>
@@ -2105,7 +2105,7 @@
           <a:p>
             <a:fld id="{40AE047B-88A8-4E73-BFC2-E0D791C9FE6D}" type="datetimeFigureOut">
               <a:rPr lang="en-GB" smtClean="0"/>
-              <a:t>28/04/2022</a:t>
+              <a:t>29/04/2022</a:t>
             </a:fld>
             <a:endParaRPr lang="en-GB"/>
           </a:p>
@@ -2418,7 +2418,7 @@
           <a:p>
             <a:fld id="{40AE047B-88A8-4E73-BFC2-E0D791C9FE6D}" type="datetimeFigureOut">
               <a:rPr lang="en-GB" smtClean="0"/>
-              <a:t>28/04/2022</a:t>
+              <a:t>29/04/2022</a:t>
             </a:fld>
             <a:endParaRPr lang="en-GB"/>
           </a:p>
@@ -2707,7 +2707,7 @@
           <a:p>
             <a:fld id="{40AE047B-88A8-4E73-BFC2-E0D791C9FE6D}" type="datetimeFigureOut">
               <a:rPr lang="en-GB" smtClean="0"/>
-              <a:t>28/04/2022</a:t>
+              <a:t>29/04/2022</a:t>
             </a:fld>
             <a:endParaRPr lang="en-GB"/>
           </a:p>
@@ -2950,7 +2950,7 @@
           <a:p>
             <a:fld id="{40AE047B-88A8-4E73-BFC2-E0D791C9FE6D}" type="datetimeFigureOut">
               <a:rPr lang="en-GB" smtClean="0"/>
-              <a:t>28/04/2022</a:t>
+              <a:t>29/04/2022</a:t>
             </a:fld>
             <a:endParaRPr lang="en-GB"/>
           </a:p>
@@ -13406,7 +13406,7 @@
           <a:p>
             <a:r>
               <a:rPr lang="en-GB" sz="1400" dirty="0"/>
-              <a:t>Height cm</a:t>
+              <a:t>Height (m)</a:t>
             </a:r>
           </a:p>
         </p:txBody>
@@ -13441,7 +13441,7 @@
           <a:p>
             <a:r>
               <a:rPr lang="en-GB" sz="1400" dirty="0"/>
-              <a:t>Time s</a:t>
+              <a:t>Time (s)</a:t>
             </a:r>
           </a:p>
         </p:txBody>
@@ -13476,7 +13476,7 @@
           <a:p>
             <a:r>
               <a:rPr lang="en-GB" sz="1400" dirty="0"/>
-              <a:t>Time s</a:t>
+              <a:t>Time (s)</a:t>
             </a:r>
           </a:p>
         </p:txBody>
@@ -13511,7 +13511,7 @@
           <a:p>
             <a:r>
               <a:rPr lang="en-GB" sz="1400" dirty="0"/>
-              <a:t>Time s</a:t>
+              <a:t>Time (s)</a:t>
             </a:r>
           </a:p>
         </p:txBody>
@@ -13530,7 +13530,7 @@
         </p:nvSpPr>
         <p:spPr>
           <a:xfrm>
-            <a:off x="5227017" y="1115289"/>
+            <a:off x="5183869" y="1115577"/>
             <a:ext cx="1409953" cy="307777"/>
           </a:xfrm>
           <a:prstGeom prst="rect">
@@ -13546,7 +13546,7 @@
           <a:p>
             <a:r>
               <a:rPr lang="en-GB" sz="1400" dirty="0"/>
-              <a:t>Average Time s</a:t>
+              <a:t>Average Time (s)</a:t>
             </a:r>
           </a:p>
         </p:txBody>
@@ -13819,8 +13819,8 @@
         </p:nvSpPr>
         <p:spPr>
           <a:xfrm>
-            <a:off x="9036008" y="1423354"/>
-            <a:ext cx="1532074" cy="954107"/>
+            <a:off x="9036007" y="1423354"/>
+            <a:ext cx="1635015" cy="1169551"/>
           </a:xfrm>
           <a:prstGeom prst="rect">
             <a:avLst/>
@@ -13835,7 +13835,7 @@
           <a:p>
             <a:r>
               <a:rPr lang="en-GB" sz="1400" dirty="0"/>
-              <a:t>Remember to put the unit in the header not in each line</a:t>
+              <a:t>Remember to put the unit in brackets in the header. These should be in SI units</a:t>
             </a:r>
           </a:p>
         </p:txBody>
@@ -14040,7 +14040,7 @@
         </p:nvCxnSpPr>
         <p:spPr>
           <a:xfrm>
-            <a:off x="6475486" y="1065789"/>
+            <a:off x="6522416" y="1065517"/>
             <a:ext cx="0" cy="2107361"/>
           </a:xfrm>
           <a:prstGeom prst="line">
@@ -14099,6 +14099,821 @@
               <a:rPr lang="en-GB" sz="1400" dirty="0"/>
               <a:t>Velocity (m/s)</a:t>
             </a:r>
+          </a:p>
+        </p:txBody>
+      </p:sp>
+      <p:sp>
+        <p:nvSpPr>
+          <p:cNvPr id="2" name="TextBox 1">
+            <a:extLst>
+              <a:ext uri="{FF2B5EF4-FFF2-40B4-BE49-F238E27FC236}">
+                <a16:creationId xmlns:a16="http://schemas.microsoft.com/office/drawing/2014/main" id="{BD282887-87D3-416C-9361-24EF8372128B}"/>
+              </a:ext>
+            </a:extLst>
+          </p:cNvPr>
+          <p:cNvSpPr txBox="1"/>
+          <p:nvPr/>
+        </p:nvSpPr>
+        <p:spPr>
+          <a:xfrm>
+            <a:off x="786472" y="4249990"/>
+            <a:ext cx="1059735" cy="1446550"/>
+          </a:xfrm>
+          <a:prstGeom prst="rect">
+            <a:avLst/>
+          </a:prstGeom>
+          <a:noFill/>
+        </p:spPr>
+        <p:txBody>
+          <a:bodyPr wrap="square" rtlCol="0">
+            <a:spAutoFit/>
+          </a:bodyPr>
+          <a:lstStyle/>
+          <a:p>
+            <a:r>
+              <a:rPr lang="en-GB" sz="8800" b="1" dirty="0">
+                <a:solidFill>
+                  <a:srgbClr val="FF0000"/>
+                </a:solidFill>
+                <a:latin typeface="Segoe Print" panose="02000600000000000000" pitchFamily="2" charset="0"/>
+              </a:rPr>
+              <a:t>B</a:t>
+            </a:r>
+          </a:p>
+        </p:txBody>
+      </p:sp>
+      <p:sp>
+        <p:nvSpPr>
+          <p:cNvPr id="7" name="Oval 6">
+            <a:extLst>
+              <a:ext uri="{FF2B5EF4-FFF2-40B4-BE49-F238E27FC236}">
+                <a16:creationId xmlns:a16="http://schemas.microsoft.com/office/drawing/2014/main" id="{488E7150-BD60-4BD9-B79F-F9FBE3E09588}"/>
+              </a:ext>
+            </a:extLst>
+          </p:cNvPr>
+          <p:cNvSpPr/>
+          <p:nvPr/>
+        </p:nvSpPr>
+        <p:spPr>
+          <a:xfrm>
+            <a:off x="527598" y="4129032"/>
+            <a:ext cx="1585058" cy="1567508"/>
+          </a:xfrm>
+          <a:custGeom>
+            <a:avLst/>
+            <a:gdLst>
+              <a:gd name="connsiteX0" fmla="*/ 0 w 1585058"/>
+              <a:gd name="connsiteY0" fmla="*/ 783754 h 1567508"/>
+              <a:gd name="connsiteX1" fmla="*/ 792529 w 1585058"/>
+              <a:gd name="connsiteY1" fmla="*/ 0 h 1567508"/>
+              <a:gd name="connsiteX2" fmla="*/ 1585058 w 1585058"/>
+              <a:gd name="connsiteY2" fmla="*/ 783754 h 1567508"/>
+              <a:gd name="connsiteX3" fmla="*/ 792529 w 1585058"/>
+              <a:gd name="connsiteY3" fmla="*/ 1567508 h 1567508"/>
+              <a:gd name="connsiteX4" fmla="*/ 0 w 1585058"/>
+              <a:gd name="connsiteY4" fmla="*/ 783754 h 1567508"/>
+            </a:gdLst>
+            <a:ahLst/>
+            <a:cxnLst>
+              <a:cxn ang="0">
+                <a:pos x="connsiteX0" y="connsiteY0"/>
+              </a:cxn>
+              <a:cxn ang="0">
+                <a:pos x="connsiteX1" y="connsiteY1"/>
+              </a:cxn>
+              <a:cxn ang="0">
+                <a:pos x="connsiteX2" y="connsiteY2"/>
+              </a:cxn>
+              <a:cxn ang="0">
+                <a:pos x="connsiteX3" y="connsiteY3"/>
+              </a:cxn>
+              <a:cxn ang="0">
+                <a:pos x="connsiteX4" y="connsiteY4"/>
+              </a:cxn>
+            </a:cxnLst>
+            <a:rect l="l" t="t" r="r" b="b"/>
+            <a:pathLst>
+              <a:path w="1585058" h="1567508" extrusionOk="0">
+                <a:moveTo>
+                  <a:pt x="0" y="783754"/>
+                </a:moveTo>
+                <a:cubicBezTo>
+                  <a:pt x="-41375" y="270404"/>
+                  <a:pt x="265505" y="95612"/>
+                  <a:pt x="792529" y="0"/>
+                </a:cubicBezTo>
+                <a:cubicBezTo>
+                  <a:pt x="1261808" y="19010"/>
+                  <a:pt x="1542767" y="270637"/>
+                  <a:pt x="1585058" y="783754"/>
+                </a:cubicBezTo>
+                <a:cubicBezTo>
+                  <a:pt x="1539983" y="1207138"/>
+                  <a:pt x="1235338" y="1526604"/>
+                  <a:pt x="792529" y="1567508"/>
+                </a:cubicBezTo>
+                <a:cubicBezTo>
+                  <a:pt x="298642" y="1490066"/>
+                  <a:pt x="22983" y="1185144"/>
+                  <a:pt x="0" y="783754"/>
+                </a:cubicBezTo>
+                <a:close/>
+              </a:path>
+            </a:pathLst>
+          </a:custGeom>
+          <a:noFill/>
+          <a:ln w="76200">
+            <a:solidFill>
+              <a:srgbClr val="FF0000"/>
+            </a:solidFill>
+            <a:extLst>
+              <a:ext uri="{C807C97D-BFC1-408E-A445-0C87EB9F89A2}">
+                <ask:lineSketchStyleProps xmlns:ask="http://schemas.microsoft.com/office/drawing/2018/sketchyshapes" sd="4172447036">
+                  <a:prstGeom prst="ellipse">
+                    <a:avLst/>
+                  </a:prstGeom>
+                  <ask:type>
+                    <ask:lineSketchScribble/>
+                  </ask:type>
+                </ask:lineSketchStyleProps>
+              </a:ext>
+            </a:extLst>
+          </a:ln>
+        </p:spPr>
+        <p:style>
+          <a:lnRef idx="2">
+            <a:schemeClr val="accent1">
+              <a:shade val="50000"/>
+            </a:schemeClr>
+          </a:lnRef>
+          <a:fillRef idx="1">
+            <a:schemeClr val="accent1"/>
+          </a:fillRef>
+          <a:effectRef idx="0">
+            <a:schemeClr val="accent1"/>
+          </a:effectRef>
+          <a:fontRef idx="minor">
+            <a:schemeClr val="lt1"/>
+          </a:fontRef>
+        </p:style>
+        <p:txBody>
+          <a:bodyPr rtlCol="0" anchor="ctr"/>
+          <a:lstStyle/>
+          <a:p>
+            <a:pPr algn="ctr"/>
+            <a:endParaRPr lang="en-GB"/>
+          </a:p>
+        </p:txBody>
+      </p:sp>
+      <p:sp>
+        <p:nvSpPr>
+          <p:cNvPr id="31" name="TextBox 30">
+            <a:extLst>
+              <a:ext uri="{FF2B5EF4-FFF2-40B4-BE49-F238E27FC236}">
+                <a16:creationId xmlns:a16="http://schemas.microsoft.com/office/drawing/2014/main" id="{757AA4D3-FD5F-4EC6-87E5-806F3CF37C9F}"/>
+              </a:ext>
+            </a:extLst>
+          </p:cNvPr>
+          <p:cNvSpPr txBox="1"/>
+          <p:nvPr/>
+        </p:nvSpPr>
+        <p:spPr>
+          <a:xfrm>
+            <a:off x="5485891" y="4195490"/>
+            <a:ext cx="1059735" cy="1446550"/>
+          </a:xfrm>
+          <a:prstGeom prst="rect">
+            <a:avLst/>
+          </a:prstGeom>
+          <a:noFill/>
+        </p:spPr>
+        <p:txBody>
+          <a:bodyPr wrap="square" rtlCol="0">
+            <a:spAutoFit/>
+          </a:bodyPr>
+          <a:lstStyle/>
+          <a:p>
+            <a:r>
+              <a:rPr lang="en-GB" sz="8800" b="1" dirty="0">
+                <a:solidFill>
+                  <a:srgbClr val="FF0000"/>
+                </a:solidFill>
+                <a:latin typeface="Segoe Print" panose="02000600000000000000" pitchFamily="2" charset="0"/>
+              </a:rPr>
+              <a:t>A</a:t>
+            </a:r>
+          </a:p>
+        </p:txBody>
+      </p:sp>
+      <p:sp>
+        <p:nvSpPr>
+          <p:cNvPr id="33" name="Oval 32">
+            <a:extLst>
+              <a:ext uri="{FF2B5EF4-FFF2-40B4-BE49-F238E27FC236}">
+                <a16:creationId xmlns:a16="http://schemas.microsoft.com/office/drawing/2014/main" id="{ECC5B53C-2038-48B6-845C-83BF34DB0F79}"/>
+              </a:ext>
+            </a:extLst>
+          </p:cNvPr>
+          <p:cNvSpPr/>
+          <p:nvPr/>
+        </p:nvSpPr>
+        <p:spPr>
+          <a:xfrm>
+            <a:off x="5227017" y="4074532"/>
+            <a:ext cx="1585058" cy="1567508"/>
+          </a:xfrm>
+          <a:custGeom>
+            <a:avLst/>
+            <a:gdLst>
+              <a:gd name="connsiteX0" fmla="*/ 0 w 1585058"/>
+              <a:gd name="connsiteY0" fmla="*/ 783754 h 1567508"/>
+              <a:gd name="connsiteX1" fmla="*/ 792529 w 1585058"/>
+              <a:gd name="connsiteY1" fmla="*/ 0 h 1567508"/>
+              <a:gd name="connsiteX2" fmla="*/ 1585058 w 1585058"/>
+              <a:gd name="connsiteY2" fmla="*/ 783754 h 1567508"/>
+              <a:gd name="connsiteX3" fmla="*/ 792529 w 1585058"/>
+              <a:gd name="connsiteY3" fmla="*/ 1567508 h 1567508"/>
+              <a:gd name="connsiteX4" fmla="*/ 0 w 1585058"/>
+              <a:gd name="connsiteY4" fmla="*/ 783754 h 1567508"/>
+            </a:gdLst>
+            <a:ahLst/>
+            <a:cxnLst>
+              <a:cxn ang="0">
+                <a:pos x="connsiteX0" y="connsiteY0"/>
+              </a:cxn>
+              <a:cxn ang="0">
+                <a:pos x="connsiteX1" y="connsiteY1"/>
+              </a:cxn>
+              <a:cxn ang="0">
+                <a:pos x="connsiteX2" y="connsiteY2"/>
+              </a:cxn>
+              <a:cxn ang="0">
+                <a:pos x="connsiteX3" y="connsiteY3"/>
+              </a:cxn>
+              <a:cxn ang="0">
+                <a:pos x="connsiteX4" y="connsiteY4"/>
+              </a:cxn>
+            </a:cxnLst>
+            <a:rect l="l" t="t" r="r" b="b"/>
+            <a:pathLst>
+              <a:path w="1585058" h="1567508" extrusionOk="0">
+                <a:moveTo>
+                  <a:pt x="0" y="783754"/>
+                </a:moveTo>
+                <a:cubicBezTo>
+                  <a:pt x="-41375" y="270404"/>
+                  <a:pt x="265505" y="95612"/>
+                  <a:pt x="792529" y="0"/>
+                </a:cubicBezTo>
+                <a:cubicBezTo>
+                  <a:pt x="1261808" y="19010"/>
+                  <a:pt x="1542767" y="270637"/>
+                  <a:pt x="1585058" y="783754"/>
+                </a:cubicBezTo>
+                <a:cubicBezTo>
+                  <a:pt x="1539983" y="1207138"/>
+                  <a:pt x="1235338" y="1526604"/>
+                  <a:pt x="792529" y="1567508"/>
+                </a:cubicBezTo>
+                <a:cubicBezTo>
+                  <a:pt x="298642" y="1490066"/>
+                  <a:pt x="22983" y="1185144"/>
+                  <a:pt x="0" y="783754"/>
+                </a:cubicBezTo>
+                <a:close/>
+              </a:path>
+            </a:pathLst>
+          </a:custGeom>
+          <a:noFill/>
+          <a:ln w="76200">
+            <a:solidFill>
+              <a:srgbClr val="FF0000"/>
+            </a:solidFill>
+            <a:extLst>
+              <a:ext uri="{C807C97D-BFC1-408E-A445-0C87EB9F89A2}">
+                <ask:lineSketchStyleProps xmlns:ask="http://schemas.microsoft.com/office/drawing/2018/sketchyshapes" sd="4172447036">
+                  <a:prstGeom prst="ellipse">
+                    <a:avLst/>
+                  </a:prstGeom>
+                  <ask:type>
+                    <ask:lineSketchScribble/>
+                  </ask:type>
+                </ask:lineSketchStyleProps>
+              </a:ext>
+            </a:extLst>
+          </a:ln>
+        </p:spPr>
+        <p:style>
+          <a:lnRef idx="2">
+            <a:schemeClr val="accent1">
+              <a:shade val="50000"/>
+            </a:schemeClr>
+          </a:lnRef>
+          <a:fillRef idx="1">
+            <a:schemeClr val="accent1"/>
+          </a:fillRef>
+          <a:effectRef idx="0">
+            <a:schemeClr val="accent1"/>
+          </a:effectRef>
+          <a:fontRef idx="minor">
+            <a:schemeClr val="lt1"/>
+          </a:fontRef>
+        </p:style>
+        <p:txBody>
+          <a:bodyPr rtlCol="0" anchor="ctr"/>
+          <a:lstStyle/>
+          <a:p>
+            <a:pPr algn="ctr"/>
+            <a:endParaRPr lang="en-GB"/>
+          </a:p>
+        </p:txBody>
+      </p:sp>
+      <p:sp>
+        <p:nvSpPr>
+          <p:cNvPr id="38" name="TextBox 37">
+            <a:extLst>
+              <a:ext uri="{FF2B5EF4-FFF2-40B4-BE49-F238E27FC236}">
+                <a16:creationId xmlns:a16="http://schemas.microsoft.com/office/drawing/2014/main" id="{9FBF16C7-7F0B-489A-A206-BD039C1BBFE1}"/>
+              </a:ext>
+            </a:extLst>
+          </p:cNvPr>
+          <p:cNvSpPr txBox="1"/>
+          <p:nvPr/>
+        </p:nvSpPr>
+        <p:spPr>
+          <a:xfrm>
+            <a:off x="7600824" y="4195490"/>
+            <a:ext cx="1059735" cy="1446550"/>
+          </a:xfrm>
+          <a:prstGeom prst="rect">
+            <a:avLst/>
+          </a:prstGeom>
+          <a:noFill/>
+        </p:spPr>
+        <p:txBody>
+          <a:bodyPr wrap="square" rtlCol="0">
+            <a:spAutoFit/>
+          </a:bodyPr>
+          <a:lstStyle/>
+          <a:p>
+            <a:r>
+              <a:rPr lang="en-GB" sz="8800" b="1" dirty="0">
+                <a:solidFill>
+                  <a:srgbClr val="FF0000"/>
+                </a:solidFill>
+                <a:latin typeface="Segoe Print" panose="02000600000000000000" pitchFamily="2" charset="0"/>
+              </a:rPr>
+              <a:t>C</a:t>
+            </a:r>
+          </a:p>
+        </p:txBody>
+      </p:sp>
+      <p:sp>
+        <p:nvSpPr>
+          <p:cNvPr id="40" name="Oval 39">
+            <a:extLst>
+              <a:ext uri="{FF2B5EF4-FFF2-40B4-BE49-F238E27FC236}">
+                <a16:creationId xmlns:a16="http://schemas.microsoft.com/office/drawing/2014/main" id="{E11E3A99-6444-4E8F-877F-4054F8797028}"/>
+              </a:ext>
+            </a:extLst>
+          </p:cNvPr>
+          <p:cNvSpPr/>
+          <p:nvPr/>
+        </p:nvSpPr>
+        <p:spPr>
+          <a:xfrm>
+            <a:off x="7341950" y="4074532"/>
+            <a:ext cx="1585058" cy="1567508"/>
+          </a:xfrm>
+          <a:custGeom>
+            <a:avLst/>
+            <a:gdLst>
+              <a:gd name="connsiteX0" fmla="*/ 0 w 1585058"/>
+              <a:gd name="connsiteY0" fmla="*/ 783754 h 1567508"/>
+              <a:gd name="connsiteX1" fmla="*/ 792529 w 1585058"/>
+              <a:gd name="connsiteY1" fmla="*/ 0 h 1567508"/>
+              <a:gd name="connsiteX2" fmla="*/ 1585058 w 1585058"/>
+              <a:gd name="connsiteY2" fmla="*/ 783754 h 1567508"/>
+              <a:gd name="connsiteX3" fmla="*/ 792529 w 1585058"/>
+              <a:gd name="connsiteY3" fmla="*/ 1567508 h 1567508"/>
+              <a:gd name="connsiteX4" fmla="*/ 0 w 1585058"/>
+              <a:gd name="connsiteY4" fmla="*/ 783754 h 1567508"/>
+            </a:gdLst>
+            <a:ahLst/>
+            <a:cxnLst>
+              <a:cxn ang="0">
+                <a:pos x="connsiteX0" y="connsiteY0"/>
+              </a:cxn>
+              <a:cxn ang="0">
+                <a:pos x="connsiteX1" y="connsiteY1"/>
+              </a:cxn>
+              <a:cxn ang="0">
+                <a:pos x="connsiteX2" y="connsiteY2"/>
+              </a:cxn>
+              <a:cxn ang="0">
+                <a:pos x="connsiteX3" y="connsiteY3"/>
+              </a:cxn>
+              <a:cxn ang="0">
+                <a:pos x="connsiteX4" y="connsiteY4"/>
+              </a:cxn>
+            </a:cxnLst>
+            <a:rect l="l" t="t" r="r" b="b"/>
+            <a:pathLst>
+              <a:path w="1585058" h="1567508" extrusionOk="0">
+                <a:moveTo>
+                  <a:pt x="0" y="783754"/>
+                </a:moveTo>
+                <a:cubicBezTo>
+                  <a:pt x="-41375" y="270404"/>
+                  <a:pt x="265505" y="95612"/>
+                  <a:pt x="792529" y="0"/>
+                </a:cubicBezTo>
+                <a:cubicBezTo>
+                  <a:pt x="1261808" y="19010"/>
+                  <a:pt x="1542767" y="270637"/>
+                  <a:pt x="1585058" y="783754"/>
+                </a:cubicBezTo>
+                <a:cubicBezTo>
+                  <a:pt x="1539983" y="1207138"/>
+                  <a:pt x="1235338" y="1526604"/>
+                  <a:pt x="792529" y="1567508"/>
+                </a:cubicBezTo>
+                <a:cubicBezTo>
+                  <a:pt x="298642" y="1490066"/>
+                  <a:pt x="22983" y="1185144"/>
+                  <a:pt x="0" y="783754"/>
+                </a:cubicBezTo>
+                <a:close/>
+              </a:path>
+            </a:pathLst>
+          </a:custGeom>
+          <a:noFill/>
+          <a:ln w="76200">
+            <a:solidFill>
+              <a:srgbClr val="FF0000"/>
+            </a:solidFill>
+            <a:extLst>
+              <a:ext uri="{C807C97D-BFC1-408E-A445-0C87EB9F89A2}">
+                <ask:lineSketchStyleProps xmlns:ask="http://schemas.microsoft.com/office/drawing/2018/sketchyshapes" sd="4172447036">
+                  <a:prstGeom prst="ellipse">
+                    <a:avLst/>
+                  </a:prstGeom>
+                  <ask:type>
+                    <ask:lineSketchScribble/>
+                  </ask:type>
+                </ask:lineSketchStyleProps>
+              </a:ext>
+            </a:extLst>
+          </a:ln>
+        </p:spPr>
+        <p:style>
+          <a:lnRef idx="2">
+            <a:schemeClr val="accent1">
+              <a:shade val="50000"/>
+            </a:schemeClr>
+          </a:lnRef>
+          <a:fillRef idx="1">
+            <a:schemeClr val="accent1"/>
+          </a:fillRef>
+          <a:effectRef idx="0">
+            <a:schemeClr val="accent1"/>
+          </a:effectRef>
+          <a:fontRef idx="minor">
+            <a:schemeClr val="lt1"/>
+          </a:fontRef>
+        </p:style>
+        <p:txBody>
+          <a:bodyPr rtlCol="0" anchor="ctr"/>
+          <a:lstStyle/>
+          <a:p>
+            <a:pPr algn="ctr"/>
+            <a:endParaRPr lang="en-GB"/>
+          </a:p>
+        </p:txBody>
+      </p:sp>
+      <p:sp>
+        <p:nvSpPr>
+          <p:cNvPr id="42" name="TextBox 41">
+            <a:extLst>
+              <a:ext uri="{FF2B5EF4-FFF2-40B4-BE49-F238E27FC236}">
+                <a16:creationId xmlns:a16="http://schemas.microsoft.com/office/drawing/2014/main" id="{37B4193E-51C3-44E9-BCB4-98C652C9CCB5}"/>
+              </a:ext>
+            </a:extLst>
+          </p:cNvPr>
+          <p:cNvSpPr txBox="1"/>
+          <p:nvPr/>
+        </p:nvSpPr>
+        <p:spPr>
+          <a:xfrm>
+            <a:off x="9896157" y="4195490"/>
+            <a:ext cx="1059735" cy="1446550"/>
+          </a:xfrm>
+          <a:prstGeom prst="rect">
+            <a:avLst/>
+          </a:prstGeom>
+          <a:noFill/>
+        </p:spPr>
+        <p:txBody>
+          <a:bodyPr wrap="square" rtlCol="0">
+            <a:spAutoFit/>
+          </a:bodyPr>
+          <a:lstStyle/>
+          <a:p>
+            <a:r>
+              <a:rPr lang="en-GB" sz="8800" b="1" dirty="0">
+                <a:solidFill>
+                  <a:srgbClr val="FF0000"/>
+                </a:solidFill>
+                <a:latin typeface="Segoe Print" panose="02000600000000000000" pitchFamily="2" charset="0"/>
+              </a:rPr>
+              <a:t>D</a:t>
+            </a:r>
+          </a:p>
+        </p:txBody>
+      </p:sp>
+      <p:sp>
+        <p:nvSpPr>
+          <p:cNvPr id="43" name="Oval 42">
+            <a:extLst>
+              <a:ext uri="{FF2B5EF4-FFF2-40B4-BE49-F238E27FC236}">
+                <a16:creationId xmlns:a16="http://schemas.microsoft.com/office/drawing/2014/main" id="{F8DD20D4-568D-4334-AE9F-76B73EF5D237}"/>
+              </a:ext>
+            </a:extLst>
+          </p:cNvPr>
+          <p:cNvSpPr/>
+          <p:nvPr/>
+        </p:nvSpPr>
+        <p:spPr>
+          <a:xfrm>
+            <a:off x="9637283" y="4074532"/>
+            <a:ext cx="1585058" cy="1567508"/>
+          </a:xfrm>
+          <a:custGeom>
+            <a:avLst/>
+            <a:gdLst>
+              <a:gd name="connsiteX0" fmla="*/ 0 w 1585058"/>
+              <a:gd name="connsiteY0" fmla="*/ 783754 h 1567508"/>
+              <a:gd name="connsiteX1" fmla="*/ 792529 w 1585058"/>
+              <a:gd name="connsiteY1" fmla="*/ 0 h 1567508"/>
+              <a:gd name="connsiteX2" fmla="*/ 1585058 w 1585058"/>
+              <a:gd name="connsiteY2" fmla="*/ 783754 h 1567508"/>
+              <a:gd name="connsiteX3" fmla="*/ 792529 w 1585058"/>
+              <a:gd name="connsiteY3" fmla="*/ 1567508 h 1567508"/>
+              <a:gd name="connsiteX4" fmla="*/ 0 w 1585058"/>
+              <a:gd name="connsiteY4" fmla="*/ 783754 h 1567508"/>
+            </a:gdLst>
+            <a:ahLst/>
+            <a:cxnLst>
+              <a:cxn ang="0">
+                <a:pos x="connsiteX0" y="connsiteY0"/>
+              </a:cxn>
+              <a:cxn ang="0">
+                <a:pos x="connsiteX1" y="connsiteY1"/>
+              </a:cxn>
+              <a:cxn ang="0">
+                <a:pos x="connsiteX2" y="connsiteY2"/>
+              </a:cxn>
+              <a:cxn ang="0">
+                <a:pos x="connsiteX3" y="connsiteY3"/>
+              </a:cxn>
+              <a:cxn ang="0">
+                <a:pos x="connsiteX4" y="connsiteY4"/>
+              </a:cxn>
+            </a:cxnLst>
+            <a:rect l="l" t="t" r="r" b="b"/>
+            <a:pathLst>
+              <a:path w="1585058" h="1567508" extrusionOk="0">
+                <a:moveTo>
+                  <a:pt x="0" y="783754"/>
+                </a:moveTo>
+                <a:cubicBezTo>
+                  <a:pt x="-41375" y="270404"/>
+                  <a:pt x="265505" y="95612"/>
+                  <a:pt x="792529" y="0"/>
+                </a:cubicBezTo>
+                <a:cubicBezTo>
+                  <a:pt x="1261808" y="19010"/>
+                  <a:pt x="1542767" y="270637"/>
+                  <a:pt x="1585058" y="783754"/>
+                </a:cubicBezTo>
+                <a:cubicBezTo>
+                  <a:pt x="1539983" y="1207138"/>
+                  <a:pt x="1235338" y="1526604"/>
+                  <a:pt x="792529" y="1567508"/>
+                </a:cubicBezTo>
+                <a:cubicBezTo>
+                  <a:pt x="298642" y="1490066"/>
+                  <a:pt x="22983" y="1185144"/>
+                  <a:pt x="0" y="783754"/>
+                </a:cubicBezTo>
+                <a:close/>
+              </a:path>
+            </a:pathLst>
+          </a:custGeom>
+          <a:noFill/>
+          <a:ln w="76200">
+            <a:solidFill>
+              <a:srgbClr val="FF0000"/>
+            </a:solidFill>
+            <a:extLst>
+              <a:ext uri="{C807C97D-BFC1-408E-A445-0C87EB9F89A2}">
+                <ask:lineSketchStyleProps xmlns:ask="http://schemas.microsoft.com/office/drawing/2018/sketchyshapes" sd="4172447036">
+                  <a:prstGeom prst="ellipse">
+                    <a:avLst/>
+                  </a:prstGeom>
+                  <ask:type>
+                    <ask:lineSketchScribble/>
+                  </ask:type>
+                </ask:lineSketchStyleProps>
+              </a:ext>
+            </a:extLst>
+          </a:ln>
+        </p:spPr>
+        <p:style>
+          <a:lnRef idx="2">
+            <a:schemeClr val="accent1">
+              <a:shade val="50000"/>
+            </a:schemeClr>
+          </a:lnRef>
+          <a:fillRef idx="1">
+            <a:schemeClr val="accent1"/>
+          </a:fillRef>
+          <a:effectRef idx="0">
+            <a:schemeClr val="accent1"/>
+          </a:effectRef>
+          <a:fontRef idx="minor">
+            <a:schemeClr val="lt1"/>
+          </a:fontRef>
+        </p:style>
+        <p:txBody>
+          <a:bodyPr rtlCol="0" anchor="ctr"/>
+          <a:lstStyle/>
+          <a:p>
+            <a:pPr algn="ctr"/>
+            <a:endParaRPr lang="en-GB"/>
+          </a:p>
+        </p:txBody>
+      </p:sp>
+      <p:sp>
+        <p:nvSpPr>
+          <p:cNvPr id="44" name="TextBox 43">
+            <a:extLst>
+              <a:ext uri="{FF2B5EF4-FFF2-40B4-BE49-F238E27FC236}">
+                <a16:creationId xmlns:a16="http://schemas.microsoft.com/office/drawing/2014/main" id="{4579BE50-06E9-47D0-8BF0-78B4C09EA558}"/>
+              </a:ext>
+            </a:extLst>
+          </p:cNvPr>
+          <p:cNvSpPr txBox="1"/>
+          <p:nvPr/>
+        </p:nvSpPr>
+        <p:spPr>
+          <a:xfrm>
+            <a:off x="2978867" y="4239467"/>
+            <a:ext cx="1059735" cy="1446550"/>
+          </a:xfrm>
+          <a:prstGeom prst="rect">
+            <a:avLst/>
+          </a:prstGeom>
+          <a:noFill/>
+        </p:spPr>
+        <p:txBody>
+          <a:bodyPr wrap="square" rtlCol="0">
+            <a:spAutoFit/>
+          </a:bodyPr>
+          <a:lstStyle/>
+          <a:p>
+            <a:r>
+              <a:rPr lang="en-GB" sz="8800" b="1" dirty="0">
+                <a:solidFill>
+                  <a:srgbClr val="FF0000"/>
+                </a:solidFill>
+                <a:latin typeface="Segoe Print" panose="02000600000000000000" pitchFamily="2" charset="0"/>
+              </a:rPr>
+              <a:t>E</a:t>
+            </a:r>
+          </a:p>
+        </p:txBody>
+      </p:sp>
+      <p:sp>
+        <p:nvSpPr>
+          <p:cNvPr id="45" name="Oval 44">
+            <a:extLst>
+              <a:ext uri="{FF2B5EF4-FFF2-40B4-BE49-F238E27FC236}">
+                <a16:creationId xmlns:a16="http://schemas.microsoft.com/office/drawing/2014/main" id="{F41D7EA9-F1FF-41A0-A386-2F2318D33A47}"/>
+              </a:ext>
+            </a:extLst>
+          </p:cNvPr>
+          <p:cNvSpPr/>
+          <p:nvPr/>
+        </p:nvSpPr>
+        <p:spPr>
+          <a:xfrm>
+            <a:off x="2719993" y="4118509"/>
+            <a:ext cx="1585058" cy="1567508"/>
+          </a:xfrm>
+          <a:custGeom>
+            <a:avLst/>
+            <a:gdLst>
+              <a:gd name="connsiteX0" fmla="*/ 0 w 1585058"/>
+              <a:gd name="connsiteY0" fmla="*/ 783754 h 1567508"/>
+              <a:gd name="connsiteX1" fmla="*/ 792529 w 1585058"/>
+              <a:gd name="connsiteY1" fmla="*/ 0 h 1567508"/>
+              <a:gd name="connsiteX2" fmla="*/ 1585058 w 1585058"/>
+              <a:gd name="connsiteY2" fmla="*/ 783754 h 1567508"/>
+              <a:gd name="connsiteX3" fmla="*/ 792529 w 1585058"/>
+              <a:gd name="connsiteY3" fmla="*/ 1567508 h 1567508"/>
+              <a:gd name="connsiteX4" fmla="*/ 0 w 1585058"/>
+              <a:gd name="connsiteY4" fmla="*/ 783754 h 1567508"/>
+            </a:gdLst>
+            <a:ahLst/>
+            <a:cxnLst>
+              <a:cxn ang="0">
+                <a:pos x="connsiteX0" y="connsiteY0"/>
+              </a:cxn>
+              <a:cxn ang="0">
+                <a:pos x="connsiteX1" y="connsiteY1"/>
+              </a:cxn>
+              <a:cxn ang="0">
+                <a:pos x="connsiteX2" y="connsiteY2"/>
+              </a:cxn>
+              <a:cxn ang="0">
+                <a:pos x="connsiteX3" y="connsiteY3"/>
+              </a:cxn>
+              <a:cxn ang="0">
+                <a:pos x="connsiteX4" y="connsiteY4"/>
+              </a:cxn>
+            </a:cxnLst>
+            <a:rect l="l" t="t" r="r" b="b"/>
+            <a:pathLst>
+              <a:path w="1585058" h="1567508" extrusionOk="0">
+                <a:moveTo>
+                  <a:pt x="0" y="783754"/>
+                </a:moveTo>
+                <a:cubicBezTo>
+                  <a:pt x="-41375" y="270404"/>
+                  <a:pt x="265505" y="95612"/>
+                  <a:pt x="792529" y="0"/>
+                </a:cubicBezTo>
+                <a:cubicBezTo>
+                  <a:pt x="1261808" y="19010"/>
+                  <a:pt x="1542767" y="270637"/>
+                  <a:pt x="1585058" y="783754"/>
+                </a:cubicBezTo>
+                <a:cubicBezTo>
+                  <a:pt x="1539983" y="1207138"/>
+                  <a:pt x="1235338" y="1526604"/>
+                  <a:pt x="792529" y="1567508"/>
+                </a:cubicBezTo>
+                <a:cubicBezTo>
+                  <a:pt x="298642" y="1490066"/>
+                  <a:pt x="22983" y="1185144"/>
+                  <a:pt x="0" y="783754"/>
+                </a:cubicBezTo>
+                <a:close/>
+              </a:path>
+            </a:pathLst>
+          </a:custGeom>
+          <a:noFill/>
+          <a:ln w="76200">
+            <a:solidFill>
+              <a:srgbClr val="FF0000"/>
+            </a:solidFill>
+            <a:extLst>
+              <a:ext uri="{C807C97D-BFC1-408E-A445-0C87EB9F89A2}">
+                <ask:lineSketchStyleProps xmlns:ask="http://schemas.microsoft.com/office/drawing/2018/sketchyshapes" sd="4172447036">
+                  <a:prstGeom prst="ellipse">
+                    <a:avLst/>
+                  </a:prstGeom>
+                  <ask:type>
+                    <ask:lineSketchScribble/>
+                  </ask:type>
+                </ask:lineSketchStyleProps>
+              </a:ext>
+            </a:extLst>
+          </a:ln>
+        </p:spPr>
+        <p:style>
+          <a:lnRef idx="2">
+            <a:schemeClr val="accent1">
+              <a:shade val="50000"/>
+            </a:schemeClr>
+          </a:lnRef>
+          <a:fillRef idx="1">
+            <a:schemeClr val="accent1"/>
+          </a:fillRef>
+          <a:effectRef idx="0">
+            <a:schemeClr val="accent1"/>
+          </a:effectRef>
+          <a:fontRef idx="minor">
+            <a:schemeClr val="lt1"/>
+          </a:fontRef>
+        </p:style>
+        <p:txBody>
+          <a:bodyPr rtlCol="0" anchor="ctr"/>
+          <a:lstStyle/>
+          <a:p>
+            <a:pPr algn="ctr"/>
+            <a:endParaRPr lang="en-GB"/>
           </a:p>
         </p:txBody>
       </p:sp>

</xml_diff>